<commit_message>
Preliminary training for COAD-READ
</commit_message>
<xml_diff>
--- a/PAAD_Presentation.pptx
+++ b/PAAD_Presentation.pptx
@@ -58,7 +58,10 @@
     <p:sldId id="313" r:id="rId52"/>
     <p:sldId id="319" r:id="rId53"/>
     <p:sldId id="312" r:id="rId54"/>
-    <p:sldId id="320" r:id="rId55"/>
+    <p:sldId id="321" r:id="rId55"/>
+    <p:sldId id="322" r:id="rId56"/>
+    <p:sldId id="323" r:id="rId57"/>
+    <p:sldId id="324" r:id="rId58"/>
   </p:sldIdLst>
   <p:sldSz cx="12192000" cy="6858000"/>
   <p:notesSz cx="6858000" cy="9144000"/>
@@ -312,7 +315,7 @@
           <a:p>
             <a:fld id="{E816971E-1CC9-4B1B-B84A-56D45306C128}" type="datetimeFigureOut">
               <a:rPr lang="es-ES" smtClean="0"/>
-              <a:t>14/06/2022</a:t>
+              <a:t>21/06/2022</a:t>
             </a:fld>
             <a:endParaRPr lang="es-ES"/>
           </a:p>
@@ -482,7 +485,7 @@
           <a:p>
             <a:fld id="{E816971E-1CC9-4B1B-B84A-56D45306C128}" type="datetimeFigureOut">
               <a:rPr lang="es-ES" smtClean="0"/>
-              <a:t>14/06/2022</a:t>
+              <a:t>21/06/2022</a:t>
             </a:fld>
             <a:endParaRPr lang="es-ES"/>
           </a:p>
@@ -662,7 +665,7 @@
           <a:p>
             <a:fld id="{E816971E-1CC9-4B1B-B84A-56D45306C128}" type="datetimeFigureOut">
               <a:rPr lang="es-ES" smtClean="0"/>
-              <a:t>14/06/2022</a:t>
+              <a:t>21/06/2022</a:t>
             </a:fld>
             <a:endParaRPr lang="es-ES"/>
           </a:p>
@@ -832,7 +835,7 @@
           <a:p>
             <a:fld id="{E816971E-1CC9-4B1B-B84A-56D45306C128}" type="datetimeFigureOut">
               <a:rPr lang="es-ES" smtClean="0"/>
-              <a:t>14/06/2022</a:t>
+              <a:t>21/06/2022</a:t>
             </a:fld>
             <a:endParaRPr lang="es-ES"/>
           </a:p>
@@ -1078,7 +1081,7 @@
           <a:p>
             <a:fld id="{E816971E-1CC9-4B1B-B84A-56D45306C128}" type="datetimeFigureOut">
               <a:rPr lang="es-ES" smtClean="0"/>
-              <a:t>14/06/2022</a:t>
+              <a:t>21/06/2022</a:t>
             </a:fld>
             <a:endParaRPr lang="es-ES"/>
           </a:p>
@@ -1310,7 +1313,7 @@
           <a:p>
             <a:fld id="{E816971E-1CC9-4B1B-B84A-56D45306C128}" type="datetimeFigureOut">
               <a:rPr lang="es-ES" smtClean="0"/>
-              <a:t>14/06/2022</a:t>
+              <a:t>21/06/2022</a:t>
             </a:fld>
             <a:endParaRPr lang="es-ES"/>
           </a:p>
@@ -1677,7 +1680,7 @@
           <a:p>
             <a:fld id="{E816971E-1CC9-4B1B-B84A-56D45306C128}" type="datetimeFigureOut">
               <a:rPr lang="es-ES" smtClean="0"/>
-              <a:t>14/06/2022</a:t>
+              <a:t>21/06/2022</a:t>
             </a:fld>
             <a:endParaRPr lang="es-ES"/>
           </a:p>
@@ -1795,7 +1798,7 @@
           <a:p>
             <a:fld id="{E816971E-1CC9-4B1B-B84A-56D45306C128}" type="datetimeFigureOut">
               <a:rPr lang="es-ES" smtClean="0"/>
-              <a:t>14/06/2022</a:t>
+              <a:t>21/06/2022</a:t>
             </a:fld>
             <a:endParaRPr lang="es-ES"/>
           </a:p>
@@ -1890,7 +1893,7 @@
           <a:p>
             <a:fld id="{E816971E-1CC9-4B1B-B84A-56D45306C128}" type="datetimeFigureOut">
               <a:rPr lang="es-ES" smtClean="0"/>
-              <a:t>14/06/2022</a:t>
+              <a:t>21/06/2022</a:t>
             </a:fld>
             <a:endParaRPr lang="es-ES"/>
           </a:p>
@@ -2167,7 +2170,7 @@
           <a:p>
             <a:fld id="{E816971E-1CC9-4B1B-B84A-56D45306C128}" type="datetimeFigureOut">
               <a:rPr lang="es-ES" smtClean="0"/>
-              <a:t>14/06/2022</a:t>
+              <a:t>21/06/2022</a:t>
             </a:fld>
             <a:endParaRPr lang="es-ES"/>
           </a:p>
@@ -2420,7 +2423,7 @@
           <a:p>
             <a:fld id="{E816971E-1CC9-4B1B-B84A-56D45306C128}" type="datetimeFigureOut">
               <a:rPr lang="es-ES" smtClean="0"/>
-              <a:t>14/06/2022</a:t>
+              <a:t>21/06/2022</a:t>
             </a:fld>
             <a:endParaRPr lang="es-ES"/>
           </a:p>
@@ -2633,7 +2636,7 @@
           <a:p>
             <a:fld id="{E816971E-1CC9-4B1B-B84A-56D45306C128}" type="datetimeFigureOut">
               <a:rPr lang="es-ES" smtClean="0"/>
-              <a:t>14/06/2022</a:t>
+              <a:t>21/06/2022</a:t>
             </a:fld>
             <a:endParaRPr lang="es-ES"/>
           </a:p>
@@ -5394,7 +5397,7 @@
           <a:graphicData uri="http://schemas.openxmlformats.org/presentationml/2006/ole">
             <mc:AlternateContent xmlns:mc="http://schemas.openxmlformats.org/markup-compatibility/2006">
               <mc:Choice xmlns:v="urn:schemas-microsoft-com:vml" Requires="v">
-                <p:oleObj spid="_x0000_s2123" name="Acrobat Document" r:id="rId3" imgW="3428684" imgH="4800600" progId="AcroExch.Document.7">
+                <p:oleObj spid="_x0000_s2126" name="Acrobat Document" r:id="rId3" imgW="3428684" imgH="4800600" progId="AcroExch.Document.7">
                   <p:embed/>
                 </p:oleObj>
               </mc:Choice>
@@ -7513,7 +7516,7 @@
           <a:graphicData uri="http://schemas.openxmlformats.org/presentationml/2006/ole">
             <mc:AlternateContent xmlns:mc="http://schemas.openxmlformats.org/markup-compatibility/2006">
               <mc:Choice xmlns:v="urn:schemas-microsoft-com:vml" Requires="v">
-                <p:oleObj spid="_x0000_s3105" name="Acrobat Document" r:id="rId3" imgW="3428684" imgH="4800600" progId="AcroExch.Document.7">
+                <p:oleObj spid="_x0000_s3108" name="Acrobat Document" r:id="rId3" imgW="3428684" imgH="4800600" progId="AcroExch.Document.7">
                   <p:embed/>
                 </p:oleObj>
               </mc:Choice>
@@ -8115,7 +8118,7 @@
     <p:controls>
       <mc:AlternateContent xmlns:mc="http://schemas.openxmlformats.org/markup-compatibility/2006">
         <mc:Choice xmlns:v="urn:schemas-microsoft-com:vml" Requires="v">
-          <p:control spid="1423" name="HTMLCheckbox1" r:id="rId2" imgW="257040" imgH="304920"/>
+          <p:control spid="1435" name="HTMLCheckbox1" r:id="rId2" imgW="257040" imgH="304920"/>
         </mc:Choice>
         <mc:Fallback>
           <p:control name="HTMLCheckbox1" r:id="rId2" imgW="257040" imgH="304920">
@@ -8167,7 +8170,7 @@
       </mc:AlternateContent>
       <mc:AlternateContent xmlns:mc="http://schemas.openxmlformats.org/markup-compatibility/2006">
         <mc:Choice xmlns:v="urn:schemas-microsoft-com:vml" Requires="v">
-          <p:control spid="1424" name="HTMLCheckbox2" r:id="rId3" imgW="257040" imgH="304920"/>
+          <p:control spid="1436" name="HTMLCheckbox2" r:id="rId3" imgW="257040" imgH="304920"/>
         </mc:Choice>
         <mc:Fallback>
           <p:control name="HTMLCheckbox2" r:id="rId3" imgW="257040" imgH="304920">
@@ -8219,7 +8222,7 @@
       </mc:AlternateContent>
       <mc:AlternateContent xmlns:mc="http://schemas.openxmlformats.org/markup-compatibility/2006">
         <mc:Choice xmlns:v="urn:schemas-microsoft-com:vml" Requires="v">
-          <p:control spid="1425" name="HTMLCheckbox3" r:id="rId4" imgW="257040" imgH="304920"/>
+          <p:control spid="1437" name="HTMLCheckbox3" r:id="rId4" imgW="257040" imgH="304920"/>
         </mc:Choice>
         <mc:Fallback>
           <p:control name="HTMLCheckbox3" r:id="rId4" imgW="257040" imgH="304920">
@@ -8271,7 +8274,7 @@
       </mc:AlternateContent>
       <mc:AlternateContent xmlns:mc="http://schemas.openxmlformats.org/markup-compatibility/2006">
         <mc:Choice xmlns:v="urn:schemas-microsoft-com:vml" Requires="v">
-          <p:control spid="1426" name="HTMLCheckbox4" r:id="rId5" imgW="257040" imgH="304920"/>
+          <p:control spid="1438" name="HTMLCheckbox4" r:id="rId5" imgW="257040" imgH="304920"/>
         </mc:Choice>
         <mc:Fallback>
           <p:control name="HTMLCheckbox4" r:id="rId5" imgW="257040" imgH="304920">
@@ -11114,33 +11117,62 @@
             <a:spLocks noGrp="1"/>
           </p:cNvSpPr>
           <p:nvPr>
-            <p:ph type="title"/>
-          </p:nvPr>
-        </p:nvSpPr>
-        <p:spPr/>
-        <p:txBody>
-          <a:bodyPr/>
-          <a:lstStyle/>
-          <a:p>
-            <a:endParaRPr lang="es-ES"/>
-          </a:p>
-        </p:txBody>
-      </p:sp>
-      <p:sp>
-        <p:nvSpPr>
-          <p:cNvPr id="3" name="Marcador de contenido 2"/>
-          <p:cNvSpPr>
-            <a:spLocks noGrp="1"/>
-          </p:cNvSpPr>
-          <p:nvPr>
-            <p:ph idx="1"/>
-          </p:nvPr>
-        </p:nvSpPr>
-        <p:spPr/>
-        <p:txBody>
-          <a:bodyPr/>
-          <a:lstStyle/>
-          <a:p>
+            <p:ph type="ctrTitle"/>
+          </p:nvPr>
+        </p:nvSpPr>
+        <p:spPr>
+          <a:xfrm>
+            <a:off x="1524000" y="1122363"/>
+            <a:ext cx="9144000" cy="496125"/>
+          </a:xfrm>
+        </p:spPr>
+        <p:txBody>
+          <a:bodyPr>
+            <a:normAutofit fontScale="90000"/>
+          </a:bodyPr>
+          <a:lstStyle/>
+          <a:p>
+            <a:r>
+              <a:rPr lang="es-ES" dirty="0"/>
+              <a:t>Fusión de datos </a:t>
+            </a:r>
+            <a:r>
+              <a:rPr lang="es-ES" dirty="0" smtClean="0"/>
+              <a:t>heterogéneos: </a:t>
+            </a:r>
+            <a:endParaRPr lang="es-ES" dirty="0"/>
+          </a:p>
+        </p:txBody>
+      </p:sp>
+      <p:sp>
+        <p:nvSpPr>
+          <p:cNvPr id="3" name="Subtítulo 2"/>
+          <p:cNvSpPr>
+            <a:spLocks noGrp="1"/>
+          </p:cNvSpPr>
+          <p:nvPr>
+            <p:ph type="subTitle" idx="1"/>
+          </p:nvPr>
+        </p:nvSpPr>
+        <p:spPr>
+          <a:xfrm>
+            <a:off x="1524000" y="1755648"/>
+            <a:ext cx="9144000" cy="3502152"/>
+          </a:xfrm>
+        </p:spPr>
+        <p:txBody>
+          <a:bodyPr>
+            <a:normAutofit/>
+          </a:bodyPr>
+          <a:lstStyle/>
+          <a:p>
+            <a:endParaRPr lang="es-ES" dirty="0" smtClean="0"/>
+          </a:p>
+          <a:p>
+            <a:r>
+              <a:rPr lang="es-ES" dirty="0" smtClean="0"/>
+              <a:t>22/06/22</a:t>
+            </a:r>
             <a:endParaRPr lang="es-ES" dirty="0"/>
           </a:p>
         </p:txBody>
@@ -11148,7 +11180,417 @@
     </p:spTree>
     <p:extLst>
       <p:ext uri="{BB962C8B-B14F-4D97-AF65-F5344CB8AC3E}">
-        <p14:creationId xmlns:p14="http://schemas.microsoft.com/office/powerpoint/2010/main" val="639327384"/>
+        <p14:creationId xmlns:p14="http://schemas.microsoft.com/office/powerpoint/2010/main" val="2165125099"/>
+      </p:ext>
+    </p:extLst>
+  </p:cSld>
+  <p:clrMapOvr>
+    <a:masterClrMapping/>
+  </p:clrMapOvr>
+</p:sld>
+</file>
+
+<file path=ppt/slides/slide55.xml><?xml version="1.0" encoding="utf-8"?>
+<p:sld xmlns:a="http://schemas.openxmlformats.org/drawingml/2006/main" xmlns:r="http://schemas.openxmlformats.org/officeDocument/2006/relationships" xmlns:p="http://schemas.openxmlformats.org/presentationml/2006/main">
+  <p:cSld>
+    <p:spTree>
+      <p:nvGrpSpPr>
+        <p:cNvPr id="1" name=""/>
+        <p:cNvGrpSpPr/>
+        <p:nvPr/>
+      </p:nvGrpSpPr>
+      <p:grpSpPr>
+        <a:xfrm>
+          <a:off x="0" y="0"/>
+          <a:ext cx="0" cy="0"/>
+          <a:chOff x="0" y="0"/>
+          <a:chExt cx="0" cy="0"/>
+        </a:xfrm>
+      </p:grpSpPr>
+      <p:sp>
+        <p:nvSpPr>
+          <p:cNvPr id="2" name="Título 1"/>
+          <p:cNvSpPr>
+            <a:spLocks noGrp="1"/>
+          </p:cNvSpPr>
+          <p:nvPr>
+            <p:ph type="title"/>
+          </p:nvPr>
+        </p:nvSpPr>
+        <p:spPr/>
+        <p:txBody>
+          <a:bodyPr/>
+          <a:lstStyle/>
+          <a:p>
+            <a:r>
+              <a:rPr lang="es-ES" dirty="0" smtClean="0"/>
+              <a:t>Problema: Falta de datos</a:t>
+            </a:r>
+            <a:endParaRPr lang="es-ES" dirty="0"/>
+          </a:p>
+        </p:txBody>
+      </p:sp>
+      <p:sp>
+        <p:nvSpPr>
+          <p:cNvPr id="3" name="Marcador de contenido 2"/>
+          <p:cNvSpPr>
+            <a:spLocks noGrp="1"/>
+          </p:cNvSpPr>
+          <p:nvPr>
+            <p:ph idx="1"/>
+          </p:nvPr>
+        </p:nvSpPr>
+        <p:spPr/>
+        <p:txBody>
+          <a:bodyPr/>
+          <a:lstStyle/>
+          <a:p>
+            <a:r>
+              <a:rPr lang="es-ES" dirty="0" smtClean="0"/>
+              <a:t>Para </a:t>
+            </a:r>
+            <a:r>
+              <a:rPr lang="es-ES" dirty="0" err="1" smtClean="0"/>
+              <a:t>RNASeq</a:t>
+            </a:r>
+            <a:r>
+              <a:rPr lang="es-ES" dirty="0" smtClean="0"/>
+              <a:t> y otros datos hay menos de 10 </a:t>
+            </a:r>
+            <a:r>
+              <a:rPr lang="es-ES" dirty="0" err="1" smtClean="0"/>
+              <a:t>samples</a:t>
+            </a:r>
+            <a:r>
+              <a:rPr lang="es-ES" dirty="0"/>
+              <a:t> </a:t>
+            </a:r>
+            <a:r>
+              <a:rPr lang="es-ES" dirty="0" smtClean="0"/>
+              <a:t>positivas para páncreas.</a:t>
+            </a:r>
+          </a:p>
+          <a:p>
+            <a:endParaRPr lang="es-ES" dirty="0"/>
+          </a:p>
+          <a:p>
+            <a:r>
+              <a:rPr lang="es-ES" dirty="0" smtClean="0"/>
+              <a:t>Solución: Usar otro set</a:t>
+            </a:r>
+          </a:p>
+          <a:p>
+            <a:endParaRPr lang="es-ES" dirty="0" smtClean="0"/>
+          </a:p>
+          <a:p>
+            <a:endParaRPr lang="es-ES" dirty="0"/>
+          </a:p>
+        </p:txBody>
+      </p:sp>
+    </p:spTree>
+    <p:extLst>
+      <p:ext uri="{BB962C8B-B14F-4D97-AF65-F5344CB8AC3E}">
+        <p14:creationId xmlns:p14="http://schemas.microsoft.com/office/powerpoint/2010/main" val="2296678827"/>
+      </p:ext>
+    </p:extLst>
+  </p:cSld>
+  <p:clrMapOvr>
+    <a:masterClrMapping/>
+  </p:clrMapOvr>
+</p:sld>
+</file>
+
+<file path=ppt/slides/slide56.xml><?xml version="1.0" encoding="utf-8"?>
+<p:sld xmlns:a="http://schemas.openxmlformats.org/drawingml/2006/main" xmlns:r="http://schemas.openxmlformats.org/officeDocument/2006/relationships" xmlns:p="http://schemas.openxmlformats.org/presentationml/2006/main">
+  <p:cSld>
+    <p:spTree>
+      <p:nvGrpSpPr>
+        <p:cNvPr id="1" name=""/>
+        <p:cNvGrpSpPr/>
+        <p:nvPr/>
+      </p:nvGrpSpPr>
+      <p:grpSpPr>
+        <a:xfrm>
+          <a:off x="0" y="0"/>
+          <a:ext cx="0" cy="0"/>
+          <a:chOff x="0" y="0"/>
+          <a:chExt cx="0" cy="0"/>
+        </a:xfrm>
+      </p:grpSpPr>
+      <p:sp>
+        <p:nvSpPr>
+          <p:cNvPr id="2" name="Título 1"/>
+          <p:cNvSpPr>
+            <a:spLocks noGrp="1"/>
+          </p:cNvSpPr>
+          <p:nvPr>
+            <p:ph type="title"/>
+          </p:nvPr>
+        </p:nvSpPr>
+        <p:spPr/>
+        <p:txBody>
+          <a:bodyPr/>
+          <a:lstStyle/>
+          <a:p>
+            <a:r>
+              <a:rPr lang="es-ES" dirty="0" smtClean="0"/>
+              <a:t>TGCA: READ-COAD</a:t>
+            </a:r>
+            <a:endParaRPr lang="es-ES" dirty="0"/>
+          </a:p>
+        </p:txBody>
+      </p:sp>
+      <p:sp>
+        <p:nvSpPr>
+          <p:cNvPr id="3" name="Marcador de contenido 2"/>
+          <p:cNvSpPr>
+            <a:spLocks noGrp="1"/>
+          </p:cNvSpPr>
+          <p:nvPr>
+            <p:ph idx="1"/>
+          </p:nvPr>
+        </p:nvSpPr>
+        <p:spPr>
+          <a:xfrm>
+            <a:off x="6342425" y="1690689"/>
+            <a:ext cx="5011374" cy="4486274"/>
+          </a:xfrm>
+        </p:spPr>
+        <p:txBody>
+          <a:bodyPr/>
+          <a:lstStyle/>
+          <a:p>
+            <a:r>
+              <a:rPr lang="es-ES" dirty="0" smtClean="0"/>
+              <a:t>Problema de 3 clases</a:t>
+            </a:r>
+          </a:p>
+          <a:p>
+            <a:endParaRPr lang="es-ES" dirty="0" smtClean="0"/>
+          </a:p>
+          <a:p>
+            <a:r>
+              <a:rPr lang="es-ES" dirty="0" smtClean="0"/>
+              <a:t>Más casos, 627 en vez de 185</a:t>
+            </a:r>
+            <a:endParaRPr lang="es-ES" dirty="0"/>
+          </a:p>
+        </p:txBody>
+      </p:sp>
+      <p:pic>
+        <p:nvPicPr>
+          <p:cNvPr id="4100" name="Picture 4" descr="https://lh3.googleusercontent.com/CIVC0nmtD4iqwrERreEqJr1uCltYXPF3nrVOcUETQ74yCeDkYdvovoTmGJAjIbGsq5GjsVxfrhz2IzaIwLfeVs4dbfuxz4Lnoha74oOWw-9isCntRXYm6OTgOIdHCVbEbu8SG24uQIc4d8P1QKbggg"/>
+          <p:cNvPicPr>
+            <a:picLocks noChangeAspect="1" noChangeArrowheads="1"/>
+          </p:cNvPicPr>
+          <p:nvPr/>
+        </p:nvPicPr>
+        <p:blipFill>
+          <a:blip r:embed="rId2">
+            <a:extLst>
+              <a:ext uri="{28A0092B-C50C-407E-A947-70E740481C1C}">
+                <a14:useLocalDpi xmlns:a14="http://schemas.microsoft.com/office/drawing/2010/main" val="0"/>
+              </a:ext>
+            </a:extLst>
+          </a:blip>
+          <a:srcRect/>
+          <a:stretch>
+            <a:fillRect/>
+          </a:stretch>
+        </p:blipFill>
+        <p:spPr bwMode="auto">
+          <a:xfrm>
+            <a:off x="1054984" y="3007843"/>
+            <a:ext cx="5287441" cy="1639108"/>
+          </a:xfrm>
+          <a:prstGeom prst="rect">
+            <a:avLst/>
+          </a:prstGeom>
+          <a:noFill/>
+          <a:extLst>
+            <a:ext uri="{909E8E84-426E-40DD-AFC4-6F175D3DCCD1}">
+              <a14:hiddenFill xmlns:a14="http://schemas.microsoft.com/office/drawing/2010/main">
+                <a:solidFill>
+                  <a:srgbClr val="FFFFFF"/>
+                </a:solidFill>
+              </a14:hiddenFill>
+            </a:ext>
+          </a:extLst>
+        </p:spPr>
+      </p:pic>
+    </p:spTree>
+    <p:extLst>
+      <p:ext uri="{BB962C8B-B14F-4D97-AF65-F5344CB8AC3E}">
+        <p14:creationId xmlns:p14="http://schemas.microsoft.com/office/powerpoint/2010/main" val="1312462286"/>
+      </p:ext>
+    </p:extLst>
+  </p:cSld>
+  <p:clrMapOvr>
+    <a:masterClrMapping/>
+  </p:clrMapOvr>
+</p:sld>
+</file>
+
+<file path=ppt/slides/slide57.xml><?xml version="1.0" encoding="utf-8"?>
+<p:sld xmlns:a="http://schemas.openxmlformats.org/drawingml/2006/main" xmlns:r="http://schemas.openxmlformats.org/officeDocument/2006/relationships" xmlns:p="http://schemas.openxmlformats.org/presentationml/2006/main">
+  <p:cSld>
+    <p:spTree>
+      <p:nvGrpSpPr>
+        <p:cNvPr id="1" name=""/>
+        <p:cNvGrpSpPr/>
+        <p:nvPr/>
+      </p:nvGrpSpPr>
+      <p:grpSpPr>
+        <a:xfrm>
+          <a:off x="0" y="0"/>
+          <a:ext cx="0" cy="0"/>
+          <a:chOff x="0" y="0"/>
+          <a:chExt cx="0" cy="0"/>
+        </a:xfrm>
+      </p:grpSpPr>
+      <p:sp>
+        <p:nvSpPr>
+          <p:cNvPr id="2" name="Título 1"/>
+          <p:cNvSpPr>
+            <a:spLocks noGrp="1"/>
+          </p:cNvSpPr>
+          <p:nvPr>
+            <p:ph type="title"/>
+          </p:nvPr>
+        </p:nvSpPr>
+        <p:spPr/>
+        <p:txBody>
+          <a:bodyPr/>
+          <a:lstStyle/>
+          <a:p>
+            <a:r>
+              <a:rPr lang="es-ES" dirty="0" smtClean="0"/>
+              <a:t>Problema</a:t>
+            </a:r>
+            <a:endParaRPr lang="es-ES" dirty="0"/>
+          </a:p>
+        </p:txBody>
+      </p:sp>
+      <p:sp>
+        <p:nvSpPr>
+          <p:cNvPr id="3" name="Marcador de contenido 2"/>
+          <p:cNvSpPr>
+            <a:spLocks noGrp="1"/>
+          </p:cNvSpPr>
+          <p:nvPr>
+            <p:ph idx="1"/>
+          </p:nvPr>
+        </p:nvSpPr>
+        <p:spPr/>
+        <p:txBody>
+          <a:bodyPr/>
+          <a:lstStyle/>
+          <a:p>
+            <a:r>
+              <a:rPr lang="es-ES" dirty="0" smtClean="0"/>
+              <a:t>Usar </a:t>
+            </a:r>
+            <a:r>
+              <a:rPr lang="es-ES" dirty="0" err="1" smtClean="0"/>
+              <a:t>tissue</a:t>
+            </a:r>
+            <a:r>
+              <a:rPr lang="es-ES" dirty="0" smtClean="0"/>
+              <a:t> </a:t>
+            </a:r>
+            <a:r>
+              <a:rPr lang="es-ES" dirty="0" err="1" smtClean="0"/>
+              <a:t>slide</a:t>
+            </a:r>
+            <a:r>
+              <a:rPr lang="es-ES" dirty="0" smtClean="0"/>
+              <a:t> (TS) o </a:t>
+            </a:r>
+            <a:r>
+              <a:rPr lang="es-ES" dirty="0" err="1" smtClean="0"/>
+              <a:t>diagnostic</a:t>
+            </a:r>
+            <a:r>
+              <a:rPr lang="es-ES" dirty="0" smtClean="0"/>
+              <a:t> </a:t>
+            </a:r>
+            <a:r>
+              <a:rPr lang="es-ES" dirty="0" err="1" smtClean="0"/>
+              <a:t>slide</a:t>
+            </a:r>
+            <a:r>
+              <a:rPr lang="es-ES" dirty="0" smtClean="0"/>
+              <a:t> (DX) o los dos</a:t>
+            </a:r>
+          </a:p>
+          <a:p>
+            <a:pPr marL="0" indent="0">
+              <a:buNone/>
+            </a:pPr>
+            <a:endParaRPr lang="es-ES" dirty="0"/>
+          </a:p>
+          <a:p>
+            <a:r>
+              <a:rPr lang="es-ES" dirty="0" err="1" smtClean="0"/>
+              <a:t>Diagnostic</a:t>
+            </a:r>
+            <a:r>
+              <a:rPr lang="es-ES" dirty="0" smtClean="0"/>
+              <a:t> </a:t>
+            </a:r>
+            <a:r>
+              <a:rPr lang="es-ES" dirty="0" err="1" smtClean="0"/>
+              <a:t>slide</a:t>
+            </a:r>
+            <a:r>
+              <a:rPr lang="es-ES" dirty="0" smtClean="0"/>
+              <a:t>: </a:t>
+            </a:r>
+            <a:r>
+              <a:rPr lang="es-ES" dirty="0" err="1" smtClean="0"/>
+              <a:t>Samples</a:t>
+            </a:r>
+            <a:r>
+              <a:rPr lang="es-ES" dirty="0" smtClean="0"/>
+              <a:t> usadas para diagnóstico. Mejor calidad de imágenes</a:t>
+            </a:r>
+          </a:p>
+          <a:p>
+            <a:endParaRPr lang="es-ES" dirty="0"/>
+          </a:p>
+          <a:p>
+            <a:r>
+              <a:rPr lang="es-ES" dirty="0" err="1" smtClean="0"/>
+              <a:t>Tissue</a:t>
+            </a:r>
+            <a:r>
+              <a:rPr lang="es-ES" dirty="0" smtClean="0"/>
+              <a:t> </a:t>
+            </a:r>
+            <a:r>
+              <a:rPr lang="es-ES" u="sng" dirty="0" err="1" smtClean="0"/>
+              <a:t>slide</a:t>
+            </a:r>
+            <a:r>
+              <a:rPr lang="es-ES" dirty="0" smtClean="0"/>
+              <a:t>: </a:t>
+            </a:r>
+            <a:r>
+              <a:rPr lang="es-ES" dirty="0" err="1" smtClean="0"/>
+              <a:t>Samples</a:t>
+            </a:r>
+            <a:r>
+              <a:rPr lang="es-ES" dirty="0" smtClean="0"/>
+              <a:t> tomadas para hacer otros estudios</a:t>
+            </a:r>
+            <a:endParaRPr lang="es-ES" dirty="0"/>
+          </a:p>
+        </p:txBody>
+      </p:sp>
+    </p:spTree>
+    <p:extLst>
+      <p:ext uri="{BB962C8B-B14F-4D97-AF65-F5344CB8AC3E}">
+        <p14:creationId xmlns:p14="http://schemas.microsoft.com/office/powerpoint/2010/main" val="3290634519"/>
       </p:ext>
     </p:extLst>
   </p:cSld>

</xml_diff>

<commit_message>
Consigo preprocesar y entrenar RNASeq
</commit_message>
<xml_diff>
--- a/PAAD_Presentation.pptx
+++ b/PAAD_Presentation.pptx
@@ -62,6 +62,26 @@
     <p:sldId id="322" r:id="rId56"/>
     <p:sldId id="323" r:id="rId57"/>
     <p:sldId id="324" r:id="rId58"/>
+    <p:sldId id="326" r:id="rId59"/>
+    <p:sldId id="327" r:id="rId60"/>
+    <p:sldId id="328" r:id="rId61"/>
+    <p:sldId id="329" r:id="rId62"/>
+    <p:sldId id="331" r:id="rId63"/>
+    <p:sldId id="330" r:id="rId64"/>
+    <p:sldId id="333" r:id="rId65"/>
+    <p:sldId id="334" r:id="rId66"/>
+    <p:sldId id="335" r:id="rId67"/>
+    <p:sldId id="336" r:id="rId68"/>
+    <p:sldId id="337" r:id="rId69"/>
+    <p:sldId id="338" r:id="rId70"/>
+    <p:sldId id="340" r:id="rId71"/>
+    <p:sldId id="339" r:id="rId72"/>
+    <p:sldId id="341" r:id="rId73"/>
+    <p:sldId id="346" r:id="rId74"/>
+    <p:sldId id="342" r:id="rId75"/>
+    <p:sldId id="343" r:id="rId76"/>
+    <p:sldId id="344" r:id="rId77"/>
+    <p:sldId id="347" r:id="rId78"/>
   </p:sldIdLst>
   <p:sldSz cx="12192000" cy="6858000"/>
   <p:notesSz cx="6858000" cy="9144000"/>
@@ -315,7 +335,7 @@
           <a:p>
             <a:fld id="{E816971E-1CC9-4B1B-B84A-56D45306C128}" type="datetimeFigureOut">
               <a:rPr lang="es-ES" smtClean="0"/>
-              <a:t>21/06/2022</a:t>
+              <a:t>05/09/2022</a:t>
             </a:fld>
             <a:endParaRPr lang="es-ES"/>
           </a:p>
@@ -485,7 +505,7 @@
           <a:p>
             <a:fld id="{E816971E-1CC9-4B1B-B84A-56D45306C128}" type="datetimeFigureOut">
               <a:rPr lang="es-ES" smtClean="0"/>
-              <a:t>21/06/2022</a:t>
+              <a:t>05/09/2022</a:t>
             </a:fld>
             <a:endParaRPr lang="es-ES"/>
           </a:p>
@@ -665,7 +685,7 @@
           <a:p>
             <a:fld id="{E816971E-1CC9-4B1B-B84A-56D45306C128}" type="datetimeFigureOut">
               <a:rPr lang="es-ES" smtClean="0"/>
-              <a:t>21/06/2022</a:t>
+              <a:t>05/09/2022</a:t>
             </a:fld>
             <a:endParaRPr lang="es-ES"/>
           </a:p>
@@ -835,7 +855,7 @@
           <a:p>
             <a:fld id="{E816971E-1CC9-4B1B-B84A-56D45306C128}" type="datetimeFigureOut">
               <a:rPr lang="es-ES" smtClean="0"/>
-              <a:t>21/06/2022</a:t>
+              <a:t>05/09/2022</a:t>
             </a:fld>
             <a:endParaRPr lang="es-ES"/>
           </a:p>
@@ -1081,7 +1101,7 @@
           <a:p>
             <a:fld id="{E816971E-1CC9-4B1B-B84A-56D45306C128}" type="datetimeFigureOut">
               <a:rPr lang="es-ES" smtClean="0"/>
-              <a:t>21/06/2022</a:t>
+              <a:t>05/09/2022</a:t>
             </a:fld>
             <a:endParaRPr lang="es-ES"/>
           </a:p>
@@ -1313,7 +1333,7 @@
           <a:p>
             <a:fld id="{E816971E-1CC9-4B1B-B84A-56D45306C128}" type="datetimeFigureOut">
               <a:rPr lang="es-ES" smtClean="0"/>
-              <a:t>21/06/2022</a:t>
+              <a:t>05/09/2022</a:t>
             </a:fld>
             <a:endParaRPr lang="es-ES"/>
           </a:p>
@@ -1680,7 +1700,7 @@
           <a:p>
             <a:fld id="{E816971E-1CC9-4B1B-B84A-56D45306C128}" type="datetimeFigureOut">
               <a:rPr lang="es-ES" smtClean="0"/>
-              <a:t>21/06/2022</a:t>
+              <a:t>05/09/2022</a:t>
             </a:fld>
             <a:endParaRPr lang="es-ES"/>
           </a:p>
@@ -1798,7 +1818,7 @@
           <a:p>
             <a:fld id="{E816971E-1CC9-4B1B-B84A-56D45306C128}" type="datetimeFigureOut">
               <a:rPr lang="es-ES" smtClean="0"/>
-              <a:t>21/06/2022</a:t>
+              <a:t>05/09/2022</a:t>
             </a:fld>
             <a:endParaRPr lang="es-ES"/>
           </a:p>
@@ -1893,7 +1913,7 @@
           <a:p>
             <a:fld id="{E816971E-1CC9-4B1B-B84A-56D45306C128}" type="datetimeFigureOut">
               <a:rPr lang="es-ES" smtClean="0"/>
-              <a:t>21/06/2022</a:t>
+              <a:t>05/09/2022</a:t>
             </a:fld>
             <a:endParaRPr lang="es-ES"/>
           </a:p>
@@ -2170,7 +2190,7 @@
           <a:p>
             <a:fld id="{E816971E-1CC9-4B1B-B84A-56D45306C128}" type="datetimeFigureOut">
               <a:rPr lang="es-ES" smtClean="0"/>
-              <a:t>21/06/2022</a:t>
+              <a:t>05/09/2022</a:t>
             </a:fld>
             <a:endParaRPr lang="es-ES"/>
           </a:p>
@@ -2423,7 +2443,7 @@
           <a:p>
             <a:fld id="{E816971E-1CC9-4B1B-B84A-56D45306C128}" type="datetimeFigureOut">
               <a:rPr lang="es-ES" smtClean="0"/>
-              <a:t>21/06/2022</a:t>
+              <a:t>05/09/2022</a:t>
             </a:fld>
             <a:endParaRPr lang="es-ES"/>
           </a:p>
@@ -2636,7 +2656,7 @@
           <a:p>
             <a:fld id="{E816971E-1CC9-4B1B-B84A-56D45306C128}" type="datetimeFigureOut">
               <a:rPr lang="es-ES" smtClean="0"/>
-              <a:t>21/06/2022</a:t>
+              <a:t>05/09/2022</a:t>
             </a:fld>
             <a:endParaRPr lang="es-ES"/>
           </a:p>
@@ -5397,7 +5417,7 @@
           <a:graphicData uri="http://schemas.openxmlformats.org/presentationml/2006/ole">
             <mc:AlternateContent xmlns:mc="http://schemas.openxmlformats.org/markup-compatibility/2006">
               <mc:Choice xmlns:v="urn:schemas-microsoft-com:vml" Requires="v">
-                <p:oleObj spid="_x0000_s2126" name="Acrobat Document" r:id="rId3" imgW="3428684" imgH="4800600" progId="AcroExch.Document.7">
+                <p:oleObj spid="_x0000_s2147" name="Acrobat Document" r:id="rId3" imgW="3428684" imgH="4800600" progId="AcroExch.Document.7">
                   <p:embed/>
                 </p:oleObj>
               </mc:Choice>
@@ -7516,7 +7536,7 @@
           <a:graphicData uri="http://schemas.openxmlformats.org/presentationml/2006/ole">
             <mc:AlternateContent xmlns:mc="http://schemas.openxmlformats.org/markup-compatibility/2006">
               <mc:Choice xmlns:v="urn:schemas-microsoft-com:vml" Requires="v">
-                <p:oleObj spid="_x0000_s3108" name="Acrobat Document" r:id="rId3" imgW="3428684" imgH="4800600" progId="AcroExch.Document.7">
+                <p:oleObj spid="_x0000_s3129" name="Acrobat Document" r:id="rId3" imgW="3428684" imgH="4800600" progId="AcroExch.Document.7">
                   <p:embed/>
                 </p:oleObj>
               </mc:Choice>
@@ -8118,7 +8138,7 @@
     <p:controls>
       <mc:AlternateContent xmlns:mc="http://schemas.openxmlformats.org/markup-compatibility/2006">
         <mc:Choice xmlns:v="urn:schemas-microsoft-com:vml" Requires="v">
-          <p:control spid="1435" name="HTMLCheckbox1" r:id="rId2" imgW="257040" imgH="304920"/>
+          <p:control spid="1519" name="HTMLCheckbox1" r:id="rId2" imgW="257040" imgH="304920"/>
         </mc:Choice>
         <mc:Fallback>
           <p:control name="HTMLCheckbox1" r:id="rId2" imgW="257040" imgH="304920">
@@ -8170,7 +8190,7 @@
       </mc:AlternateContent>
       <mc:AlternateContent xmlns:mc="http://schemas.openxmlformats.org/markup-compatibility/2006">
         <mc:Choice xmlns:v="urn:schemas-microsoft-com:vml" Requires="v">
-          <p:control spid="1436" name="HTMLCheckbox2" r:id="rId3" imgW="257040" imgH="304920"/>
+          <p:control spid="1520" name="HTMLCheckbox2" r:id="rId3" imgW="257040" imgH="304920"/>
         </mc:Choice>
         <mc:Fallback>
           <p:control name="HTMLCheckbox2" r:id="rId3" imgW="257040" imgH="304920">
@@ -8222,7 +8242,7 @@
       </mc:AlternateContent>
       <mc:AlternateContent xmlns:mc="http://schemas.openxmlformats.org/markup-compatibility/2006">
         <mc:Choice xmlns:v="urn:schemas-microsoft-com:vml" Requires="v">
-          <p:control spid="1437" name="HTMLCheckbox3" r:id="rId4" imgW="257040" imgH="304920"/>
+          <p:control spid="1521" name="HTMLCheckbox3" r:id="rId4" imgW="257040" imgH="304920"/>
         </mc:Choice>
         <mc:Fallback>
           <p:control name="HTMLCheckbox3" r:id="rId4" imgW="257040" imgH="304920">
@@ -8274,7 +8294,7 @@
       </mc:AlternateContent>
       <mc:AlternateContent xmlns:mc="http://schemas.openxmlformats.org/markup-compatibility/2006">
         <mc:Choice xmlns:v="urn:schemas-microsoft-com:vml" Requires="v">
-          <p:control spid="1438" name="HTMLCheckbox4" r:id="rId5" imgW="257040" imgH="304920"/>
+          <p:control spid="1522" name="HTMLCheckbox4" r:id="rId5" imgW="257040" imgH="304920"/>
         </mc:Choice>
         <mc:Fallback>
           <p:control name="HTMLCheckbox4" r:id="rId5" imgW="257040" imgH="304920">
@@ -11600,6 +11620,324 @@
 </p:sld>
 </file>
 
+<file path=ppt/slides/slide58.xml><?xml version="1.0" encoding="utf-8"?>
+<p:sld xmlns:a="http://schemas.openxmlformats.org/drawingml/2006/main" xmlns:r="http://schemas.openxmlformats.org/officeDocument/2006/relationships" xmlns:p="http://schemas.openxmlformats.org/presentationml/2006/main">
+  <p:cSld>
+    <p:spTree>
+      <p:nvGrpSpPr>
+        <p:cNvPr id="1" name=""/>
+        <p:cNvGrpSpPr/>
+        <p:nvPr/>
+      </p:nvGrpSpPr>
+      <p:grpSpPr>
+        <a:xfrm>
+          <a:off x="0" y="0"/>
+          <a:ext cx="0" cy="0"/>
+          <a:chOff x="0" y="0"/>
+          <a:chExt cx="0" cy="0"/>
+        </a:xfrm>
+      </p:grpSpPr>
+      <p:sp>
+        <p:nvSpPr>
+          <p:cNvPr id="2" name="Título 1"/>
+          <p:cNvSpPr>
+            <a:spLocks noGrp="1"/>
+          </p:cNvSpPr>
+          <p:nvPr>
+            <p:ph type="ctrTitle"/>
+          </p:nvPr>
+        </p:nvSpPr>
+        <p:spPr>
+          <a:xfrm>
+            <a:off x="1524000" y="1077392"/>
+            <a:ext cx="9144000" cy="496125"/>
+          </a:xfrm>
+        </p:spPr>
+        <p:txBody>
+          <a:bodyPr>
+            <a:normAutofit fontScale="90000"/>
+          </a:bodyPr>
+          <a:lstStyle/>
+          <a:p>
+            <a:r>
+              <a:rPr lang="es-ES" dirty="0"/>
+              <a:t>Fusión de datos </a:t>
+            </a:r>
+            <a:r>
+              <a:rPr lang="es-ES" dirty="0" smtClean="0"/>
+              <a:t>heterogéneos: </a:t>
+            </a:r>
+            <a:endParaRPr lang="es-ES" dirty="0"/>
+          </a:p>
+        </p:txBody>
+      </p:sp>
+      <p:sp>
+        <p:nvSpPr>
+          <p:cNvPr id="3" name="Subtítulo 2"/>
+          <p:cNvSpPr>
+            <a:spLocks noGrp="1"/>
+          </p:cNvSpPr>
+          <p:nvPr>
+            <p:ph type="subTitle" idx="1"/>
+          </p:nvPr>
+        </p:nvSpPr>
+        <p:spPr>
+          <a:xfrm>
+            <a:off x="1524000" y="1755648"/>
+            <a:ext cx="9144000" cy="3502152"/>
+          </a:xfrm>
+        </p:spPr>
+        <p:txBody>
+          <a:bodyPr>
+            <a:normAutofit/>
+          </a:bodyPr>
+          <a:lstStyle/>
+          <a:p>
+            <a:endParaRPr lang="es-ES" dirty="0" smtClean="0"/>
+          </a:p>
+          <a:p>
+            <a:r>
+              <a:rPr lang="es-ES" dirty="0" smtClean="0"/>
+              <a:t>20/07/22</a:t>
+            </a:r>
+            <a:endParaRPr lang="es-ES" dirty="0"/>
+          </a:p>
+        </p:txBody>
+      </p:sp>
+    </p:spTree>
+    <p:extLst>
+      <p:ext uri="{BB962C8B-B14F-4D97-AF65-F5344CB8AC3E}">
+        <p14:creationId xmlns:p14="http://schemas.microsoft.com/office/powerpoint/2010/main" val="2917950408"/>
+      </p:ext>
+    </p:extLst>
+  </p:cSld>
+  <p:clrMapOvr>
+    <a:masterClrMapping/>
+  </p:clrMapOvr>
+</p:sld>
+</file>
+
+<file path=ppt/slides/slide59.xml><?xml version="1.0" encoding="utf-8"?>
+<p:sld xmlns:a="http://schemas.openxmlformats.org/drawingml/2006/main" xmlns:r="http://schemas.openxmlformats.org/officeDocument/2006/relationships" xmlns:p="http://schemas.openxmlformats.org/presentationml/2006/main">
+  <p:cSld>
+    <p:spTree>
+      <p:nvGrpSpPr>
+        <p:cNvPr id="1" name=""/>
+        <p:cNvGrpSpPr/>
+        <p:nvPr/>
+      </p:nvGrpSpPr>
+      <p:grpSpPr>
+        <a:xfrm>
+          <a:off x="0" y="0"/>
+          <a:ext cx="0" cy="0"/>
+          <a:chOff x="0" y="0"/>
+          <a:chExt cx="0" cy="0"/>
+        </a:xfrm>
+      </p:grpSpPr>
+      <p:sp>
+        <p:nvSpPr>
+          <p:cNvPr id="2" name="Título 1"/>
+          <p:cNvSpPr>
+            <a:spLocks noGrp="1"/>
+          </p:cNvSpPr>
+          <p:nvPr>
+            <p:ph type="title"/>
+          </p:nvPr>
+        </p:nvSpPr>
+        <p:spPr/>
+        <p:txBody>
+          <a:bodyPr/>
+          <a:lstStyle/>
+          <a:p>
+            <a:r>
+              <a:rPr lang="es-ES" dirty="0" smtClean="0"/>
+              <a:t>Entrenamiento </a:t>
+            </a:r>
+            <a:r>
+              <a:rPr lang="es-ES" dirty="0" err="1" smtClean="0"/>
+              <a:t>GDC+GTEx</a:t>
+            </a:r>
+            <a:r>
+              <a:rPr lang="es-ES" dirty="0" smtClean="0"/>
+              <a:t> (WSI)</a:t>
+            </a:r>
+            <a:endParaRPr lang="es-ES" dirty="0"/>
+          </a:p>
+        </p:txBody>
+      </p:sp>
+      <p:sp>
+        <p:nvSpPr>
+          <p:cNvPr id="3" name="Marcador de contenido 2"/>
+          <p:cNvSpPr>
+            <a:spLocks noGrp="1"/>
+          </p:cNvSpPr>
+          <p:nvPr>
+            <p:ph idx="1"/>
+          </p:nvPr>
+        </p:nvSpPr>
+        <p:spPr>
+          <a:xfrm>
+            <a:off x="838200" y="1825625"/>
+            <a:ext cx="6836764" cy="4351338"/>
+          </a:xfrm>
+        </p:spPr>
+        <p:txBody>
+          <a:bodyPr/>
+          <a:lstStyle/>
+          <a:p>
+            <a:r>
+              <a:rPr lang="es-ES" dirty="0" err="1"/>
+              <a:t>Patches</a:t>
+            </a:r>
+            <a:r>
+              <a:rPr lang="es-ES" dirty="0"/>
+              <a:t> </a:t>
+            </a:r>
+            <a:r>
+              <a:rPr lang="es-ES" dirty="0" err="1"/>
+              <a:t>for</a:t>
+            </a:r>
+            <a:r>
+              <a:rPr lang="es-ES" dirty="0"/>
+              <a:t> training: </a:t>
+            </a:r>
+            <a:r>
+              <a:rPr lang="es-ES" dirty="0" smtClean="0"/>
+              <a:t>70013</a:t>
+            </a:r>
+          </a:p>
+          <a:p>
+            <a:r>
+              <a:rPr lang="es-ES" dirty="0" err="1" smtClean="0"/>
+              <a:t>Patches</a:t>
+            </a:r>
+            <a:r>
+              <a:rPr lang="es-ES" dirty="0" smtClean="0"/>
+              <a:t> </a:t>
+            </a:r>
+            <a:r>
+              <a:rPr lang="es-ES" dirty="0" err="1"/>
+              <a:t>for</a:t>
+            </a:r>
+            <a:r>
+              <a:rPr lang="es-ES" dirty="0"/>
+              <a:t> </a:t>
+            </a:r>
+            <a:r>
+              <a:rPr lang="es-ES" dirty="0" err="1"/>
+              <a:t>validation</a:t>
+            </a:r>
+            <a:r>
+              <a:rPr lang="es-ES" dirty="0"/>
+              <a:t>: </a:t>
+            </a:r>
+            <a:r>
+              <a:rPr lang="es-ES" dirty="0" smtClean="0"/>
+              <a:t>8209</a:t>
+            </a:r>
+          </a:p>
+          <a:p>
+            <a:r>
+              <a:rPr lang="es-ES" dirty="0" err="1" smtClean="0"/>
+              <a:t>Patches</a:t>
+            </a:r>
+            <a:r>
+              <a:rPr lang="es-ES" dirty="0" smtClean="0"/>
+              <a:t> </a:t>
+            </a:r>
+            <a:r>
+              <a:rPr lang="es-ES" dirty="0" err="1" smtClean="0"/>
+              <a:t>for</a:t>
+            </a:r>
+            <a:r>
+              <a:rPr lang="es-ES" dirty="0" smtClean="0"/>
+              <a:t> test: 8207</a:t>
+            </a:r>
+          </a:p>
+          <a:p>
+            <a:endParaRPr lang="es-ES" dirty="0"/>
+          </a:p>
+          <a:p>
+            <a:r>
+              <a:rPr lang="es-ES" dirty="0" smtClean="0"/>
+              <a:t>Nº Imágenes: 536 </a:t>
+            </a:r>
+          </a:p>
+          <a:p>
+            <a:pPr marL="0" indent="0">
+              <a:buNone/>
+            </a:pPr>
+            <a:r>
+              <a:rPr lang="es-ES" dirty="0" smtClean="0"/>
+              <a:t>Nº </a:t>
+            </a:r>
+            <a:r>
+              <a:rPr lang="es-ES" dirty="0" err="1" smtClean="0"/>
+              <a:t>Samples</a:t>
+            </a:r>
+            <a:r>
+              <a:rPr lang="es-ES" dirty="0" smtClean="0"/>
+              <a:t>: 517</a:t>
+            </a:r>
+          </a:p>
+          <a:p>
+            <a:pPr marL="0" indent="0">
+              <a:buNone/>
+            </a:pPr>
+            <a:r>
+              <a:rPr lang="es-ES" dirty="0" smtClean="0"/>
+              <a:t>189 GDC (183 Positivas 6 Negativas)</a:t>
+            </a:r>
+          </a:p>
+          <a:p>
+            <a:pPr marL="0" indent="0">
+              <a:buNone/>
+            </a:pPr>
+            <a:r>
+              <a:rPr lang="es-ES" dirty="0" smtClean="0"/>
+              <a:t>328 </a:t>
+            </a:r>
+            <a:r>
+              <a:rPr lang="es-ES" dirty="0" err="1" smtClean="0"/>
+              <a:t>GTEx</a:t>
+            </a:r>
+            <a:r>
+              <a:rPr lang="es-ES" dirty="0" smtClean="0"/>
+              <a:t> (</a:t>
+            </a:r>
+            <a:r>
+              <a:rPr lang="es-ES" dirty="0" err="1" smtClean="0"/>
+              <a:t>Samples</a:t>
+            </a:r>
+            <a:r>
+              <a:rPr lang="es-ES" dirty="0" smtClean="0"/>
+              <a:t> con </a:t>
+            </a:r>
+            <a:r>
+              <a:rPr lang="es-ES" dirty="0" err="1" smtClean="0"/>
+              <a:t>RNASeq</a:t>
+            </a:r>
+            <a:r>
+              <a:rPr lang="es-ES" dirty="0" smtClean="0"/>
+              <a:t> e imágenes)</a:t>
+            </a:r>
+            <a:endParaRPr lang="es-ES" dirty="0"/>
+          </a:p>
+        </p:txBody>
+      </p:sp>
+    </p:spTree>
+    <p:extLst>
+      <p:ext uri="{BB962C8B-B14F-4D97-AF65-F5344CB8AC3E}">
+        <p14:creationId xmlns:p14="http://schemas.microsoft.com/office/powerpoint/2010/main" val="3586442899"/>
+      </p:ext>
+    </p:extLst>
+  </p:cSld>
+  <p:clrMapOvr>
+    <a:masterClrMapping/>
+  </p:clrMapOvr>
+</p:sld>
+</file>
+
 <file path=ppt/slides/slide6.xml><?xml version="1.0" encoding="utf-8"?>
 <p:sld xmlns:a="http://schemas.openxmlformats.org/drawingml/2006/main" xmlns:r="http://schemas.openxmlformats.org/officeDocument/2006/relationships" xmlns:p="http://schemas.openxmlformats.org/presentationml/2006/main">
   <p:cSld>
@@ -11760,6 +12098,1647 @@
     <p:extLst>
       <p:ext uri="{BB962C8B-B14F-4D97-AF65-F5344CB8AC3E}">
         <p14:creationId xmlns:p14="http://schemas.microsoft.com/office/powerpoint/2010/main" val="2217172858"/>
+      </p:ext>
+    </p:extLst>
+  </p:cSld>
+  <p:clrMapOvr>
+    <a:masterClrMapping/>
+  </p:clrMapOvr>
+</p:sld>
+</file>
+
+<file path=ppt/slides/slide60.xml><?xml version="1.0" encoding="utf-8"?>
+<p:sld xmlns:a="http://schemas.openxmlformats.org/drawingml/2006/main" xmlns:r="http://schemas.openxmlformats.org/officeDocument/2006/relationships" xmlns:p="http://schemas.openxmlformats.org/presentationml/2006/main">
+  <p:cSld>
+    <p:spTree>
+      <p:nvGrpSpPr>
+        <p:cNvPr id="1" name=""/>
+        <p:cNvGrpSpPr/>
+        <p:nvPr/>
+      </p:nvGrpSpPr>
+      <p:grpSpPr>
+        <a:xfrm>
+          <a:off x="0" y="0"/>
+          <a:ext cx="0" cy="0"/>
+          <a:chOff x="0" y="0"/>
+          <a:chExt cx="0" cy="0"/>
+        </a:xfrm>
+      </p:grpSpPr>
+      <p:sp>
+        <p:nvSpPr>
+          <p:cNvPr id="2" name="Título 1"/>
+          <p:cNvSpPr>
+            <a:spLocks noGrp="1"/>
+          </p:cNvSpPr>
+          <p:nvPr>
+            <p:ph type="title"/>
+          </p:nvPr>
+        </p:nvSpPr>
+        <p:spPr/>
+        <p:txBody>
+          <a:bodyPr/>
+          <a:lstStyle/>
+          <a:p>
+            <a:r>
+              <a:rPr lang="es-ES" dirty="0" smtClean="0"/>
+              <a:t>Entrenamiento </a:t>
+            </a:r>
+            <a:r>
+              <a:rPr lang="es-ES" dirty="0" err="1" smtClean="0"/>
+              <a:t>Patch-Wise</a:t>
+            </a:r>
+            <a:endParaRPr lang="es-ES" dirty="0"/>
+          </a:p>
+        </p:txBody>
+      </p:sp>
+      <p:pic>
+        <p:nvPicPr>
+          <p:cNvPr id="4" name="Marcador de contenido 3"/>
+          <p:cNvPicPr>
+            <a:picLocks noGrp="1" noChangeAspect="1"/>
+          </p:cNvPicPr>
+          <p:nvPr>
+            <p:ph idx="1"/>
+          </p:nvPr>
+        </p:nvPicPr>
+        <p:blipFill>
+          <a:blip r:embed="rId2"/>
+          <a:stretch>
+            <a:fillRect/>
+          </a:stretch>
+        </p:blipFill>
+        <p:spPr>
+          <a:xfrm>
+            <a:off x="838200" y="1921814"/>
+            <a:ext cx="5166808" cy="3589331"/>
+          </a:xfrm>
+          <a:prstGeom prst="rect">
+            <a:avLst/>
+          </a:prstGeom>
+        </p:spPr>
+      </p:pic>
+      <p:sp>
+        <p:nvSpPr>
+          <p:cNvPr id="5" name="Subtítulo 2"/>
+          <p:cNvSpPr txBox="1">
+            <a:spLocks/>
+          </p:cNvSpPr>
+          <p:nvPr/>
+        </p:nvSpPr>
+        <p:spPr>
+          <a:xfrm>
+            <a:off x="6280878" y="1755648"/>
+            <a:ext cx="4387121" cy="3502152"/>
+          </a:xfrm>
+          <a:prstGeom prst="rect">
+            <a:avLst/>
+          </a:prstGeom>
+        </p:spPr>
+        <p:txBody>
+          <a:bodyPr vert="horz" lIns="91440" tIns="45720" rIns="91440" bIns="45720" rtlCol="0">
+            <a:normAutofit/>
+          </a:bodyPr>
+          <a:lstStyle>
+            <a:lvl1pPr marL="228600" indent="-228600" algn="l" defTabSz="914400" rtl="0" eaLnBrk="1" latinLnBrk="0" hangingPunct="1">
+              <a:lnSpc>
+                <a:spcPct val="90000"/>
+              </a:lnSpc>
+              <a:spcBef>
+                <a:spcPts val="1000"/>
+              </a:spcBef>
+              <a:buFont typeface="Arial" panose="020B0604020202020204" pitchFamily="34" charset="0"/>
+              <a:buChar char="•"/>
+              <a:defRPr sz="2800" kern="1200">
+                <a:solidFill>
+                  <a:schemeClr val="tx1"/>
+                </a:solidFill>
+                <a:latin typeface="+mn-lt"/>
+                <a:ea typeface="+mn-ea"/>
+                <a:cs typeface="+mn-cs"/>
+              </a:defRPr>
+            </a:lvl1pPr>
+            <a:lvl2pPr marL="685800" indent="-228600" algn="l" defTabSz="914400" rtl="0" eaLnBrk="1" latinLnBrk="0" hangingPunct="1">
+              <a:lnSpc>
+                <a:spcPct val="90000"/>
+              </a:lnSpc>
+              <a:spcBef>
+                <a:spcPts val="500"/>
+              </a:spcBef>
+              <a:buFont typeface="Arial" panose="020B0604020202020204" pitchFamily="34" charset="0"/>
+              <a:buChar char="•"/>
+              <a:defRPr sz="2400" kern="1200">
+                <a:solidFill>
+                  <a:schemeClr val="tx1"/>
+                </a:solidFill>
+                <a:latin typeface="+mn-lt"/>
+                <a:ea typeface="+mn-ea"/>
+                <a:cs typeface="+mn-cs"/>
+              </a:defRPr>
+            </a:lvl2pPr>
+            <a:lvl3pPr marL="1143000" indent="-228600" algn="l" defTabSz="914400" rtl="0" eaLnBrk="1" latinLnBrk="0" hangingPunct="1">
+              <a:lnSpc>
+                <a:spcPct val="90000"/>
+              </a:lnSpc>
+              <a:spcBef>
+                <a:spcPts val="500"/>
+              </a:spcBef>
+              <a:buFont typeface="Arial" panose="020B0604020202020204" pitchFamily="34" charset="0"/>
+              <a:buChar char="•"/>
+              <a:defRPr sz="2000" kern="1200">
+                <a:solidFill>
+                  <a:schemeClr val="tx1"/>
+                </a:solidFill>
+                <a:latin typeface="+mn-lt"/>
+                <a:ea typeface="+mn-ea"/>
+                <a:cs typeface="+mn-cs"/>
+              </a:defRPr>
+            </a:lvl3pPr>
+            <a:lvl4pPr marL="1600200" indent="-228600" algn="l" defTabSz="914400" rtl="0" eaLnBrk="1" latinLnBrk="0" hangingPunct="1">
+              <a:lnSpc>
+                <a:spcPct val="90000"/>
+              </a:lnSpc>
+              <a:spcBef>
+                <a:spcPts val="500"/>
+              </a:spcBef>
+              <a:buFont typeface="Arial" panose="020B0604020202020204" pitchFamily="34" charset="0"/>
+              <a:buChar char="•"/>
+              <a:defRPr sz="1800" kern="1200">
+                <a:solidFill>
+                  <a:schemeClr val="tx1"/>
+                </a:solidFill>
+                <a:latin typeface="+mn-lt"/>
+                <a:ea typeface="+mn-ea"/>
+                <a:cs typeface="+mn-cs"/>
+              </a:defRPr>
+            </a:lvl4pPr>
+            <a:lvl5pPr marL="2057400" indent="-228600" algn="l" defTabSz="914400" rtl="0" eaLnBrk="1" latinLnBrk="0" hangingPunct="1">
+              <a:lnSpc>
+                <a:spcPct val="90000"/>
+              </a:lnSpc>
+              <a:spcBef>
+                <a:spcPts val="500"/>
+              </a:spcBef>
+              <a:buFont typeface="Arial" panose="020B0604020202020204" pitchFamily="34" charset="0"/>
+              <a:buChar char="•"/>
+              <a:defRPr sz="1800" kern="1200">
+                <a:solidFill>
+                  <a:schemeClr val="tx1"/>
+                </a:solidFill>
+                <a:latin typeface="+mn-lt"/>
+                <a:ea typeface="+mn-ea"/>
+                <a:cs typeface="+mn-cs"/>
+              </a:defRPr>
+            </a:lvl5pPr>
+            <a:lvl6pPr marL="2514600" indent="-228600" algn="l" defTabSz="914400" rtl="0" eaLnBrk="1" latinLnBrk="0" hangingPunct="1">
+              <a:lnSpc>
+                <a:spcPct val="90000"/>
+              </a:lnSpc>
+              <a:spcBef>
+                <a:spcPts val="500"/>
+              </a:spcBef>
+              <a:buFont typeface="Arial" panose="020B0604020202020204" pitchFamily="34" charset="0"/>
+              <a:buChar char="•"/>
+              <a:defRPr sz="1800" kern="1200">
+                <a:solidFill>
+                  <a:schemeClr val="tx1"/>
+                </a:solidFill>
+                <a:latin typeface="+mn-lt"/>
+                <a:ea typeface="+mn-ea"/>
+                <a:cs typeface="+mn-cs"/>
+              </a:defRPr>
+            </a:lvl6pPr>
+            <a:lvl7pPr marL="2971800" indent="-228600" algn="l" defTabSz="914400" rtl="0" eaLnBrk="1" latinLnBrk="0" hangingPunct="1">
+              <a:lnSpc>
+                <a:spcPct val="90000"/>
+              </a:lnSpc>
+              <a:spcBef>
+                <a:spcPts val="500"/>
+              </a:spcBef>
+              <a:buFont typeface="Arial" panose="020B0604020202020204" pitchFamily="34" charset="0"/>
+              <a:buChar char="•"/>
+              <a:defRPr sz="1800" kern="1200">
+                <a:solidFill>
+                  <a:schemeClr val="tx1"/>
+                </a:solidFill>
+                <a:latin typeface="+mn-lt"/>
+                <a:ea typeface="+mn-ea"/>
+                <a:cs typeface="+mn-cs"/>
+              </a:defRPr>
+            </a:lvl7pPr>
+            <a:lvl8pPr marL="3429000" indent="-228600" algn="l" defTabSz="914400" rtl="0" eaLnBrk="1" latinLnBrk="0" hangingPunct="1">
+              <a:lnSpc>
+                <a:spcPct val="90000"/>
+              </a:lnSpc>
+              <a:spcBef>
+                <a:spcPts val="500"/>
+              </a:spcBef>
+              <a:buFont typeface="Arial" panose="020B0604020202020204" pitchFamily="34" charset="0"/>
+              <a:buChar char="•"/>
+              <a:defRPr sz="1800" kern="1200">
+                <a:solidFill>
+                  <a:schemeClr val="tx1"/>
+                </a:solidFill>
+                <a:latin typeface="+mn-lt"/>
+                <a:ea typeface="+mn-ea"/>
+                <a:cs typeface="+mn-cs"/>
+              </a:defRPr>
+            </a:lvl8pPr>
+            <a:lvl9pPr marL="3886200" indent="-228600" algn="l" defTabSz="914400" rtl="0" eaLnBrk="1" latinLnBrk="0" hangingPunct="1">
+              <a:lnSpc>
+                <a:spcPct val="90000"/>
+              </a:lnSpc>
+              <a:spcBef>
+                <a:spcPts val="500"/>
+              </a:spcBef>
+              <a:buFont typeface="Arial" panose="020B0604020202020204" pitchFamily="34" charset="0"/>
+              <a:buChar char="•"/>
+              <a:defRPr sz="1800" kern="1200">
+                <a:solidFill>
+                  <a:schemeClr val="tx1"/>
+                </a:solidFill>
+                <a:latin typeface="+mn-lt"/>
+                <a:ea typeface="+mn-ea"/>
+                <a:cs typeface="+mn-cs"/>
+              </a:defRPr>
+            </a:lvl9pPr>
+          </a:lstStyle>
+          <a:p>
+            <a:endParaRPr lang="es-ES" dirty="0" smtClean="0"/>
+          </a:p>
+          <a:p>
+            <a:r>
+              <a:rPr lang="es-ES" dirty="0" smtClean="0"/>
+              <a:t>7 </a:t>
+            </a:r>
+            <a:r>
+              <a:rPr lang="es-ES" dirty="0" err="1" smtClean="0"/>
+              <a:t>epochs</a:t>
+            </a:r>
+            <a:r>
+              <a:rPr lang="es-ES" dirty="0" smtClean="0"/>
+              <a:t> por </a:t>
+            </a:r>
+            <a:r>
+              <a:rPr lang="es-ES" dirty="0" err="1" smtClean="0"/>
+              <a:t>early</a:t>
+            </a:r>
+            <a:r>
+              <a:rPr lang="es-ES" dirty="0" smtClean="0"/>
+              <a:t> </a:t>
+            </a:r>
+            <a:r>
+              <a:rPr lang="es-ES" dirty="0" err="1" smtClean="0"/>
+              <a:t>stopping</a:t>
+            </a:r>
+            <a:endParaRPr lang="es-ES" dirty="0" smtClean="0"/>
+          </a:p>
+          <a:p>
+            <a:endParaRPr lang="es-ES" dirty="0"/>
+          </a:p>
+        </p:txBody>
+      </p:sp>
+    </p:spTree>
+    <p:extLst>
+      <p:ext uri="{BB962C8B-B14F-4D97-AF65-F5344CB8AC3E}">
+        <p14:creationId xmlns:p14="http://schemas.microsoft.com/office/powerpoint/2010/main" val="1715255117"/>
+      </p:ext>
+    </p:extLst>
+  </p:cSld>
+  <p:clrMapOvr>
+    <a:masterClrMapping/>
+  </p:clrMapOvr>
+</p:sld>
+</file>
+
+<file path=ppt/slides/slide61.xml><?xml version="1.0" encoding="utf-8"?>
+<p:sld xmlns:a="http://schemas.openxmlformats.org/drawingml/2006/main" xmlns:r="http://schemas.openxmlformats.org/officeDocument/2006/relationships" xmlns:p="http://schemas.openxmlformats.org/presentationml/2006/main">
+  <p:cSld>
+    <p:spTree>
+      <p:nvGrpSpPr>
+        <p:cNvPr id="1" name=""/>
+        <p:cNvGrpSpPr/>
+        <p:nvPr/>
+      </p:nvGrpSpPr>
+      <p:grpSpPr>
+        <a:xfrm>
+          <a:off x="0" y="0"/>
+          <a:ext cx="0" cy="0"/>
+          <a:chOff x="0" y="0"/>
+          <a:chExt cx="0" cy="0"/>
+        </a:xfrm>
+      </p:grpSpPr>
+      <p:sp>
+        <p:nvSpPr>
+          <p:cNvPr id="2" name="Título 1"/>
+          <p:cNvSpPr>
+            <a:spLocks noGrp="1"/>
+          </p:cNvSpPr>
+          <p:nvPr>
+            <p:ph type="title"/>
+          </p:nvPr>
+        </p:nvSpPr>
+        <p:spPr/>
+        <p:txBody>
+          <a:bodyPr/>
+          <a:lstStyle/>
+          <a:p>
+            <a:r>
+              <a:rPr lang="es-ES" dirty="0" smtClean="0"/>
+              <a:t>Test, </a:t>
+            </a:r>
+            <a:r>
+              <a:rPr lang="es-ES" dirty="0" err="1" smtClean="0"/>
+              <a:t>Sample-Wise</a:t>
+            </a:r>
+            <a:endParaRPr lang="es-ES" dirty="0"/>
+          </a:p>
+        </p:txBody>
+      </p:sp>
+      <p:sp>
+        <p:nvSpPr>
+          <p:cNvPr id="3" name="Marcador de contenido 2"/>
+          <p:cNvSpPr>
+            <a:spLocks noGrp="1"/>
+          </p:cNvSpPr>
+          <p:nvPr>
+            <p:ph idx="1"/>
+          </p:nvPr>
+        </p:nvSpPr>
+        <p:spPr>
+          <a:xfrm>
+            <a:off x="4871802" y="1825625"/>
+            <a:ext cx="6481997" cy="4351338"/>
+          </a:xfrm>
+        </p:spPr>
+        <p:txBody>
+          <a:bodyPr/>
+          <a:lstStyle/>
+          <a:p>
+            <a:r>
+              <a:rPr lang="es-ES" dirty="0" smtClean="0"/>
+              <a:t>Buenos resultados</a:t>
+            </a:r>
+          </a:p>
+          <a:p>
+            <a:r>
+              <a:rPr lang="es-ES" dirty="0" smtClean="0"/>
+              <a:t>Balance de los parches bueno, aun sin </a:t>
+            </a:r>
+            <a:r>
+              <a:rPr lang="es-ES" dirty="0" err="1" smtClean="0"/>
+              <a:t>undersampling</a:t>
+            </a:r>
+            <a:endParaRPr lang="es-ES" dirty="0"/>
+          </a:p>
+          <a:p>
+            <a:r>
+              <a:rPr lang="es-ES" dirty="0" smtClean="0"/>
+              <a:t>Podría coger más </a:t>
+            </a:r>
+            <a:r>
+              <a:rPr lang="es-ES" dirty="0" err="1" smtClean="0"/>
+              <a:t>patches</a:t>
+            </a:r>
+            <a:r>
+              <a:rPr lang="es-ES" dirty="0" smtClean="0"/>
+              <a:t> y hacer fine </a:t>
+            </a:r>
+            <a:r>
+              <a:rPr lang="es-ES" dirty="0" err="1" smtClean="0"/>
+              <a:t>tuning</a:t>
+            </a:r>
+            <a:endParaRPr lang="es-ES" dirty="0"/>
+          </a:p>
+        </p:txBody>
+      </p:sp>
+      <p:pic>
+        <p:nvPicPr>
+          <p:cNvPr id="5" name="Imagen 4"/>
+          <p:cNvPicPr>
+            <a:picLocks noChangeAspect="1"/>
+          </p:cNvPicPr>
+          <p:nvPr/>
+        </p:nvPicPr>
+        <p:blipFill>
+          <a:blip r:embed="rId2"/>
+          <a:stretch>
+            <a:fillRect/>
+          </a:stretch>
+        </p:blipFill>
+        <p:spPr>
+          <a:xfrm>
+            <a:off x="838200" y="1825625"/>
+            <a:ext cx="3886537" cy="4298052"/>
+          </a:xfrm>
+          <a:prstGeom prst="rect">
+            <a:avLst/>
+          </a:prstGeom>
+        </p:spPr>
+      </p:pic>
+    </p:spTree>
+    <p:extLst>
+      <p:ext uri="{BB962C8B-B14F-4D97-AF65-F5344CB8AC3E}">
+        <p14:creationId xmlns:p14="http://schemas.microsoft.com/office/powerpoint/2010/main" val="2353490486"/>
+      </p:ext>
+    </p:extLst>
+  </p:cSld>
+  <p:clrMapOvr>
+    <a:masterClrMapping/>
+  </p:clrMapOvr>
+</p:sld>
+</file>
+
+<file path=ppt/slides/slide62.xml><?xml version="1.0" encoding="utf-8"?>
+<p:sld xmlns:a="http://schemas.openxmlformats.org/drawingml/2006/main" xmlns:r="http://schemas.openxmlformats.org/officeDocument/2006/relationships" xmlns:p="http://schemas.openxmlformats.org/presentationml/2006/main">
+  <p:cSld>
+    <p:spTree>
+      <p:nvGrpSpPr>
+        <p:cNvPr id="1" name=""/>
+        <p:cNvGrpSpPr/>
+        <p:nvPr/>
+      </p:nvGrpSpPr>
+      <p:grpSpPr>
+        <a:xfrm>
+          <a:off x="0" y="0"/>
+          <a:ext cx="0" cy="0"/>
+          <a:chOff x="0" y="0"/>
+          <a:chExt cx="0" cy="0"/>
+        </a:xfrm>
+      </p:grpSpPr>
+      <p:sp>
+        <p:nvSpPr>
+          <p:cNvPr id="2" name="Título 1"/>
+          <p:cNvSpPr>
+            <a:spLocks noGrp="1"/>
+          </p:cNvSpPr>
+          <p:nvPr>
+            <p:ph type="title"/>
+          </p:nvPr>
+        </p:nvSpPr>
+        <p:spPr/>
+        <p:txBody>
+          <a:bodyPr/>
+          <a:lstStyle/>
+          <a:p>
+            <a:r>
+              <a:rPr lang="es-ES" dirty="0" smtClean="0"/>
+              <a:t>Resultados 10CV</a:t>
+            </a:r>
+            <a:endParaRPr lang="es-ES" dirty="0"/>
+          </a:p>
+        </p:txBody>
+      </p:sp>
+      <p:sp>
+        <p:nvSpPr>
+          <p:cNvPr id="3" name="Marcador de contenido 2"/>
+          <p:cNvSpPr>
+            <a:spLocks noGrp="1"/>
+          </p:cNvSpPr>
+          <p:nvPr>
+            <p:ph idx="1"/>
+          </p:nvPr>
+        </p:nvSpPr>
+        <p:spPr/>
+        <p:txBody>
+          <a:bodyPr/>
+          <a:lstStyle/>
+          <a:p>
+            <a:r>
+              <a:rPr lang="es-ES" dirty="0" smtClean="0"/>
+              <a:t>(333 negativas +183 positivas)</a:t>
+            </a:r>
+          </a:p>
+          <a:p>
+            <a:endParaRPr lang="es-ES" dirty="0"/>
+          </a:p>
+          <a:p>
+            <a:r>
+              <a:rPr lang="es-ES" dirty="0" smtClean="0"/>
+              <a:t>ACC = 0.9888</a:t>
+            </a:r>
+          </a:p>
+          <a:p>
+            <a:r>
+              <a:rPr lang="es-ES" dirty="0" smtClean="0"/>
+              <a:t>F1 = 0.9914</a:t>
+            </a:r>
+          </a:p>
+          <a:p>
+            <a:endParaRPr lang="es-ES" dirty="0"/>
+          </a:p>
+          <a:p>
+            <a:r>
+              <a:rPr lang="es-ES" dirty="0" smtClean="0"/>
+              <a:t>6 Falsos positivos</a:t>
+            </a:r>
+            <a:endParaRPr lang="es-ES" dirty="0"/>
+          </a:p>
+          <a:p>
+            <a:endParaRPr lang="es-ES" dirty="0"/>
+          </a:p>
+        </p:txBody>
+      </p:sp>
+      <p:pic>
+        <p:nvPicPr>
+          <p:cNvPr id="4" name="Imagen 3"/>
+          <p:cNvPicPr>
+            <a:picLocks noChangeAspect="1"/>
+          </p:cNvPicPr>
+          <p:nvPr/>
+        </p:nvPicPr>
+        <p:blipFill>
+          <a:blip r:embed="rId2"/>
+          <a:stretch>
+            <a:fillRect/>
+          </a:stretch>
+        </p:blipFill>
+        <p:spPr>
+          <a:xfrm>
+            <a:off x="5964835" y="1930556"/>
+            <a:ext cx="5142876" cy="3657407"/>
+          </a:xfrm>
+          <a:prstGeom prst="rect">
+            <a:avLst/>
+          </a:prstGeom>
+        </p:spPr>
+      </p:pic>
+    </p:spTree>
+    <p:extLst>
+      <p:ext uri="{BB962C8B-B14F-4D97-AF65-F5344CB8AC3E}">
+        <p14:creationId xmlns:p14="http://schemas.microsoft.com/office/powerpoint/2010/main" val="1515107555"/>
+      </p:ext>
+    </p:extLst>
+  </p:cSld>
+  <p:clrMapOvr>
+    <a:masterClrMapping/>
+  </p:clrMapOvr>
+</p:sld>
+</file>
+
+<file path=ppt/slides/slide63.xml><?xml version="1.0" encoding="utf-8"?>
+<p:sld xmlns:a="http://schemas.openxmlformats.org/drawingml/2006/main" xmlns:r="http://schemas.openxmlformats.org/officeDocument/2006/relationships" xmlns:p="http://schemas.openxmlformats.org/presentationml/2006/main">
+  <p:cSld>
+    <p:spTree>
+      <p:nvGrpSpPr>
+        <p:cNvPr id="1" name=""/>
+        <p:cNvGrpSpPr/>
+        <p:nvPr/>
+      </p:nvGrpSpPr>
+      <p:grpSpPr>
+        <a:xfrm>
+          <a:off x="0" y="0"/>
+          <a:ext cx="0" cy="0"/>
+          <a:chOff x="0" y="0"/>
+          <a:chExt cx="0" cy="0"/>
+        </a:xfrm>
+      </p:grpSpPr>
+      <p:sp>
+        <p:nvSpPr>
+          <p:cNvPr id="2" name="Título 1"/>
+          <p:cNvSpPr>
+            <a:spLocks noGrp="1"/>
+          </p:cNvSpPr>
+          <p:nvPr>
+            <p:ph type="title"/>
+          </p:nvPr>
+        </p:nvSpPr>
+        <p:spPr/>
+        <p:txBody>
+          <a:bodyPr/>
+          <a:lstStyle/>
+          <a:p>
+            <a:r>
+              <a:rPr lang="es-ES" dirty="0" smtClean="0"/>
+              <a:t>Problemas</a:t>
+            </a:r>
+            <a:endParaRPr lang="es-ES" dirty="0"/>
+          </a:p>
+        </p:txBody>
+      </p:sp>
+      <p:sp>
+        <p:nvSpPr>
+          <p:cNvPr id="3" name="Marcador de contenido 2"/>
+          <p:cNvSpPr>
+            <a:spLocks noGrp="1"/>
+          </p:cNvSpPr>
+          <p:nvPr>
+            <p:ph idx="1"/>
+          </p:nvPr>
+        </p:nvSpPr>
+        <p:spPr/>
+        <p:txBody>
+          <a:bodyPr>
+            <a:normAutofit fontScale="85000" lnSpcReduction="20000"/>
+          </a:bodyPr>
+          <a:lstStyle/>
+          <a:p>
+            <a:r>
+              <a:rPr lang="es-ES" dirty="0" smtClean="0"/>
+              <a:t>Resultados muy buenos</a:t>
+            </a:r>
+          </a:p>
+          <a:p>
+            <a:pPr>
+              <a:buFontTx/>
+              <a:buChar char="-"/>
+            </a:pPr>
+            <a:r>
+              <a:rPr lang="es-ES" dirty="0" smtClean="0"/>
+              <a:t>Hay espacio para mejora usando </a:t>
+            </a:r>
+            <a:r>
+              <a:rPr lang="es-ES" dirty="0" err="1" smtClean="0"/>
+              <a:t>RNASeq</a:t>
+            </a:r>
+            <a:r>
+              <a:rPr lang="es-ES" dirty="0" smtClean="0"/>
+              <a:t>?</a:t>
+            </a:r>
+          </a:p>
+          <a:p>
+            <a:pPr>
+              <a:buFontTx/>
+              <a:buChar char="-"/>
+            </a:pPr>
+            <a:endParaRPr lang="es-ES" dirty="0"/>
+          </a:p>
+          <a:p>
+            <a:r>
+              <a:rPr lang="es-ES" dirty="0" smtClean="0"/>
+              <a:t>Paquete </a:t>
+            </a:r>
+            <a:r>
+              <a:rPr lang="es-ES" dirty="0" err="1" smtClean="0"/>
+              <a:t>KnowSeq</a:t>
+            </a:r>
+            <a:r>
+              <a:rPr lang="es-ES" dirty="0" smtClean="0"/>
+              <a:t> está anticuado para el nuevo formato de COUNTS de GDC</a:t>
+            </a:r>
+          </a:p>
+          <a:p>
+            <a:pPr>
+              <a:buFontTx/>
+              <a:buChar char="-"/>
+            </a:pPr>
+            <a:r>
+              <a:rPr lang="es-ES" dirty="0" smtClean="0"/>
+              <a:t>Intentando adaptarlo</a:t>
+            </a:r>
+          </a:p>
+          <a:p>
+            <a:pPr>
+              <a:buFontTx/>
+              <a:buChar char="-"/>
+            </a:pPr>
+            <a:r>
+              <a:rPr lang="es-ES" dirty="0" smtClean="0"/>
+              <a:t>Peleándome con R y con el paquete </a:t>
+            </a:r>
+            <a:r>
+              <a:rPr lang="es-ES" dirty="0" err="1" smtClean="0"/>
+              <a:t>KnowSeq</a:t>
+            </a:r>
+            <a:endParaRPr lang="es-ES" dirty="0" smtClean="0"/>
+          </a:p>
+          <a:p>
+            <a:pPr>
+              <a:buFontTx/>
+              <a:buChar char="-"/>
+            </a:pPr>
+            <a:endParaRPr lang="es-ES" dirty="0"/>
+          </a:p>
+          <a:p>
+            <a:r>
+              <a:rPr lang="es-ES" dirty="0" smtClean="0"/>
+              <a:t>Integración de </a:t>
+            </a:r>
+            <a:r>
+              <a:rPr lang="es-ES" dirty="0" err="1" smtClean="0"/>
+              <a:t>GTEx</a:t>
+            </a:r>
+            <a:r>
+              <a:rPr lang="es-ES" dirty="0" smtClean="0"/>
+              <a:t> con GDC? </a:t>
+            </a:r>
+            <a:r>
+              <a:rPr lang="es-ES" dirty="0" err="1" smtClean="0"/>
+              <a:t>Batch</a:t>
+            </a:r>
+            <a:r>
+              <a:rPr lang="es-ES" dirty="0" smtClean="0"/>
+              <a:t> </a:t>
+            </a:r>
+            <a:r>
+              <a:rPr lang="es-ES" dirty="0" err="1" smtClean="0"/>
+              <a:t>effect</a:t>
+            </a:r>
+            <a:r>
+              <a:rPr lang="es-ES" dirty="0" smtClean="0"/>
+              <a:t> </a:t>
+            </a:r>
+            <a:r>
+              <a:rPr lang="es-ES" dirty="0" err="1" smtClean="0"/>
+              <a:t>correction</a:t>
+            </a:r>
+            <a:r>
+              <a:rPr lang="es-ES" dirty="0" smtClean="0"/>
+              <a:t>?</a:t>
+            </a:r>
+          </a:p>
+          <a:p>
+            <a:endParaRPr lang="es-ES" dirty="0"/>
+          </a:p>
+          <a:p>
+            <a:r>
+              <a:rPr lang="es-ES" dirty="0" smtClean="0"/>
+              <a:t>En GDC y </a:t>
+            </a:r>
+            <a:r>
+              <a:rPr lang="es-ES" dirty="0" err="1" smtClean="0"/>
+              <a:t>GTEx</a:t>
+            </a:r>
+            <a:r>
+              <a:rPr lang="es-ES" dirty="0" smtClean="0"/>
+              <a:t> los genes tienen la siguiente </a:t>
+            </a:r>
+            <a:r>
+              <a:rPr lang="es-ES"/>
+              <a:t>forma ENSG00000000457.14 y ENSG00000002586.20_PAR_Y, </a:t>
+            </a:r>
+            <a:r>
+              <a:rPr lang="es-ES" dirty="0" smtClean="0"/>
+              <a:t>esto </a:t>
+            </a:r>
+            <a:r>
+              <a:rPr lang="es-ES" smtClean="0"/>
+              <a:t>da problemas</a:t>
+            </a:r>
+            <a:endParaRPr lang="es-ES" dirty="0" smtClean="0"/>
+          </a:p>
+          <a:p>
+            <a:endParaRPr lang="es-ES" dirty="0" smtClean="0"/>
+          </a:p>
+          <a:p>
+            <a:pPr marL="0" indent="0">
+              <a:buNone/>
+            </a:pPr>
+            <a:endParaRPr lang="es-ES" dirty="0"/>
+          </a:p>
+        </p:txBody>
+      </p:sp>
+    </p:spTree>
+    <p:extLst>
+      <p:ext uri="{BB962C8B-B14F-4D97-AF65-F5344CB8AC3E}">
+        <p14:creationId xmlns:p14="http://schemas.microsoft.com/office/powerpoint/2010/main" val="1497812549"/>
+      </p:ext>
+    </p:extLst>
+  </p:cSld>
+  <p:clrMapOvr>
+    <a:masterClrMapping/>
+  </p:clrMapOvr>
+</p:sld>
+</file>
+
+<file path=ppt/slides/slide64.xml><?xml version="1.0" encoding="utf-8"?>
+<p:sld xmlns:a="http://schemas.openxmlformats.org/drawingml/2006/main" xmlns:r="http://schemas.openxmlformats.org/officeDocument/2006/relationships" xmlns:p="http://schemas.openxmlformats.org/presentationml/2006/main">
+  <p:cSld>
+    <p:spTree>
+      <p:nvGrpSpPr>
+        <p:cNvPr id="1" name=""/>
+        <p:cNvGrpSpPr/>
+        <p:nvPr/>
+      </p:nvGrpSpPr>
+      <p:grpSpPr>
+        <a:xfrm>
+          <a:off x="0" y="0"/>
+          <a:ext cx="0" cy="0"/>
+          <a:chOff x="0" y="0"/>
+          <a:chExt cx="0" cy="0"/>
+        </a:xfrm>
+      </p:grpSpPr>
+      <p:sp>
+        <p:nvSpPr>
+          <p:cNvPr id="2" name="Título 1"/>
+          <p:cNvSpPr>
+            <a:spLocks noGrp="1"/>
+          </p:cNvSpPr>
+          <p:nvPr>
+            <p:ph type="ctrTitle"/>
+          </p:nvPr>
+        </p:nvSpPr>
+        <p:spPr>
+          <a:xfrm>
+            <a:off x="1524000" y="1077392"/>
+            <a:ext cx="9144000" cy="496125"/>
+          </a:xfrm>
+        </p:spPr>
+        <p:txBody>
+          <a:bodyPr>
+            <a:normAutofit fontScale="90000"/>
+          </a:bodyPr>
+          <a:lstStyle/>
+          <a:p>
+            <a:r>
+              <a:rPr lang="es-ES" dirty="0"/>
+              <a:t>Fusión de datos </a:t>
+            </a:r>
+            <a:r>
+              <a:rPr lang="es-ES" dirty="0" smtClean="0"/>
+              <a:t>heterogéneos: </a:t>
+            </a:r>
+            <a:endParaRPr lang="es-ES" dirty="0"/>
+          </a:p>
+        </p:txBody>
+      </p:sp>
+      <p:sp>
+        <p:nvSpPr>
+          <p:cNvPr id="3" name="Subtítulo 2"/>
+          <p:cNvSpPr>
+            <a:spLocks noGrp="1"/>
+          </p:cNvSpPr>
+          <p:nvPr>
+            <p:ph type="subTitle" idx="1"/>
+          </p:nvPr>
+        </p:nvSpPr>
+        <p:spPr>
+          <a:xfrm>
+            <a:off x="1524000" y="1755648"/>
+            <a:ext cx="9144000" cy="3502152"/>
+          </a:xfrm>
+        </p:spPr>
+        <p:txBody>
+          <a:bodyPr>
+            <a:normAutofit/>
+          </a:bodyPr>
+          <a:lstStyle/>
+          <a:p>
+            <a:endParaRPr lang="es-ES" dirty="0" smtClean="0"/>
+          </a:p>
+          <a:p>
+            <a:r>
+              <a:rPr lang="es-ES" dirty="0" smtClean="0"/>
+              <a:t>05/09/22</a:t>
+            </a:r>
+            <a:endParaRPr lang="es-ES" dirty="0"/>
+          </a:p>
+        </p:txBody>
+      </p:sp>
+    </p:spTree>
+    <p:extLst>
+      <p:ext uri="{BB962C8B-B14F-4D97-AF65-F5344CB8AC3E}">
+        <p14:creationId xmlns:p14="http://schemas.microsoft.com/office/powerpoint/2010/main" val="2593192115"/>
+      </p:ext>
+    </p:extLst>
+  </p:cSld>
+  <p:clrMapOvr>
+    <a:masterClrMapping/>
+  </p:clrMapOvr>
+</p:sld>
+</file>
+
+<file path=ppt/slides/slide65.xml><?xml version="1.0" encoding="utf-8"?>
+<p:sld xmlns:a="http://schemas.openxmlformats.org/drawingml/2006/main" xmlns:r="http://schemas.openxmlformats.org/officeDocument/2006/relationships" xmlns:p="http://schemas.openxmlformats.org/presentationml/2006/main">
+  <p:cSld>
+    <p:spTree>
+      <p:nvGrpSpPr>
+        <p:cNvPr id="1" name=""/>
+        <p:cNvGrpSpPr/>
+        <p:nvPr/>
+      </p:nvGrpSpPr>
+      <p:grpSpPr>
+        <a:xfrm>
+          <a:off x="0" y="0"/>
+          <a:ext cx="0" cy="0"/>
+          <a:chOff x="0" y="0"/>
+          <a:chExt cx="0" cy="0"/>
+        </a:xfrm>
+      </p:grpSpPr>
+      <p:sp>
+        <p:nvSpPr>
+          <p:cNvPr id="2" name="Título 1"/>
+          <p:cNvSpPr>
+            <a:spLocks noGrp="1"/>
+          </p:cNvSpPr>
+          <p:nvPr>
+            <p:ph type="title"/>
+          </p:nvPr>
+        </p:nvSpPr>
+        <p:spPr/>
+        <p:txBody>
+          <a:bodyPr/>
+          <a:lstStyle/>
+          <a:p>
+            <a:r>
+              <a:rPr lang="es-ES" dirty="0" smtClean="0"/>
+              <a:t>Resumen:</a:t>
+            </a:r>
+            <a:endParaRPr lang="es-ES" dirty="0"/>
+          </a:p>
+        </p:txBody>
+      </p:sp>
+      <p:sp>
+        <p:nvSpPr>
+          <p:cNvPr id="3" name="Marcador de contenido 2"/>
+          <p:cNvSpPr>
+            <a:spLocks noGrp="1"/>
+          </p:cNvSpPr>
+          <p:nvPr>
+            <p:ph idx="1"/>
+          </p:nvPr>
+        </p:nvSpPr>
+        <p:spPr/>
+        <p:txBody>
+          <a:bodyPr/>
+          <a:lstStyle/>
+          <a:p>
+            <a:pPr marL="0" indent="0">
+              <a:buNone/>
+            </a:pPr>
+            <a:r>
+              <a:rPr lang="es-ES" dirty="0" smtClean="0"/>
+              <a:t>Dos posibles problemas para estudiar:</a:t>
+            </a:r>
+          </a:p>
+          <a:p>
+            <a:pPr marL="0" indent="0">
+              <a:buNone/>
+            </a:pPr>
+            <a:endParaRPr lang="es-ES" dirty="0"/>
+          </a:p>
+          <a:p>
+            <a:r>
+              <a:rPr lang="es-ES" dirty="0"/>
+              <a:t>Problema A:</a:t>
+            </a:r>
+          </a:p>
+          <a:p>
+            <a:pPr marL="0" indent="0">
+              <a:buNone/>
+            </a:pPr>
+            <a:r>
+              <a:rPr lang="es-ES" dirty="0"/>
+              <a:t>Fusionar </a:t>
+            </a:r>
+            <a:r>
+              <a:rPr lang="es-ES" dirty="0" err="1"/>
+              <a:t>RNASeq+Imágenes</a:t>
+            </a:r>
+            <a:r>
+              <a:rPr lang="es-ES" dirty="0"/>
+              <a:t> usando las bases </a:t>
+            </a:r>
+            <a:r>
+              <a:rPr lang="es-ES" dirty="0" err="1"/>
+              <a:t>GTEx</a:t>
+            </a:r>
+            <a:r>
+              <a:rPr lang="es-ES" dirty="0"/>
+              <a:t> y </a:t>
+            </a:r>
+            <a:r>
+              <a:rPr lang="es-ES" dirty="0" smtClean="0"/>
+              <a:t>GDC</a:t>
+            </a:r>
+          </a:p>
+          <a:p>
+            <a:endParaRPr lang="es-ES" dirty="0" smtClean="0"/>
+          </a:p>
+          <a:p>
+            <a:r>
+              <a:rPr lang="es-ES" dirty="0" smtClean="0"/>
+              <a:t>Problema B: </a:t>
+            </a:r>
+          </a:p>
+          <a:p>
+            <a:pPr marL="0" indent="0">
+              <a:buNone/>
+            </a:pPr>
+            <a:r>
+              <a:rPr lang="es-ES" dirty="0" smtClean="0"/>
+              <a:t>Estadio </a:t>
+            </a:r>
+            <a:r>
+              <a:rPr lang="es-ES" dirty="0"/>
+              <a:t>de cáncer &lt;=IIA y &gt;</a:t>
+            </a:r>
+            <a:r>
+              <a:rPr lang="es-ES" dirty="0" smtClean="0"/>
+              <a:t>IIA usando </a:t>
+            </a:r>
+            <a:r>
+              <a:rPr lang="es-ES" dirty="0" err="1" smtClean="0"/>
+              <a:t>RNASeq</a:t>
+            </a:r>
+            <a:endParaRPr lang="es-ES" dirty="0" smtClean="0"/>
+          </a:p>
+          <a:p>
+            <a:pPr marL="0" indent="0">
+              <a:buNone/>
+            </a:pPr>
+            <a:endParaRPr lang="es-ES" dirty="0"/>
+          </a:p>
+          <a:p>
+            <a:pPr marL="0" indent="0">
+              <a:buNone/>
+            </a:pPr>
+            <a:endParaRPr lang="es-ES" dirty="0"/>
+          </a:p>
+          <a:p>
+            <a:pPr marL="0" indent="0">
+              <a:buNone/>
+            </a:pPr>
+            <a:endParaRPr lang="es-ES" dirty="0"/>
+          </a:p>
+          <a:p>
+            <a:pPr marL="0" indent="0">
+              <a:buNone/>
+            </a:pPr>
+            <a:endParaRPr lang="es-ES" dirty="0"/>
+          </a:p>
+        </p:txBody>
+      </p:sp>
+    </p:spTree>
+    <p:extLst>
+      <p:ext uri="{BB962C8B-B14F-4D97-AF65-F5344CB8AC3E}">
+        <p14:creationId xmlns:p14="http://schemas.microsoft.com/office/powerpoint/2010/main" val="1284988341"/>
+      </p:ext>
+    </p:extLst>
+  </p:cSld>
+  <p:clrMapOvr>
+    <a:masterClrMapping/>
+  </p:clrMapOvr>
+</p:sld>
+</file>
+
+<file path=ppt/slides/slide66.xml><?xml version="1.0" encoding="utf-8"?>
+<p:sld xmlns:a="http://schemas.openxmlformats.org/drawingml/2006/main" xmlns:r="http://schemas.openxmlformats.org/officeDocument/2006/relationships" xmlns:p="http://schemas.openxmlformats.org/presentationml/2006/main">
+  <p:cSld>
+    <p:spTree>
+      <p:nvGrpSpPr>
+        <p:cNvPr id="1" name=""/>
+        <p:cNvGrpSpPr/>
+        <p:nvPr/>
+      </p:nvGrpSpPr>
+      <p:grpSpPr>
+        <a:xfrm>
+          <a:off x="0" y="0"/>
+          <a:ext cx="0" cy="0"/>
+          <a:chOff x="0" y="0"/>
+          <a:chExt cx="0" cy="0"/>
+        </a:xfrm>
+      </p:grpSpPr>
+      <p:sp>
+        <p:nvSpPr>
+          <p:cNvPr id="2" name="Título 1"/>
+          <p:cNvSpPr>
+            <a:spLocks noGrp="1"/>
+          </p:cNvSpPr>
+          <p:nvPr>
+            <p:ph type="title"/>
+          </p:nvPr>
+        </p:nvSpPr>
+        <p:spPr/>
+        <p:txBody>
+          <a:bodyPr/>
+          <a:lstStyle/>
+          <a:p>
+            <a:r>
+              <a:rPr lang="es-ES" dirty="0" smtClean="0"/>
+              <a:t>Problema A: (WSI)</a:t>
+            </a:r>
+            <a:endParaRPr lang="es-ES" dirty="0"/>
+          </a:p>
+        </p:txBody>
+      </p:sp>
+      <p:sp>
+        <p:nvSpPr>
+          <p:cNvPr id="3" name="Marcador de contenido 2"/>
+          <p:cNvSpPr>
+            <a:spLocks noGrp="1"/>
+          </p:cNvSpPr>
+          <p:nvPr>
+            <p:ph idx="1"/>
+          </p:nvPr>
+        </p:nvSpPr>
+        <p:spPr/>
+        <p:txBody>
+          <a:bodyPr/>
+          <a:lstStyle/>
+          <a:p>
+            <a:pPr marL="0" indent="0">
+              <a:buNone/>
+            </a:pPr>
+            <a:r>
+              <a:rPr lang="es-ES" dirty="0" smtClean="0"/>
+              <a:t>Resultados 10CV</a:t>
+            </a:r>
+          </a:p>
+          <a:p>
+            <a:pPr marL="0" indent="0">
+              <a:buNone/>
+            </a:pPr>
+            <a:endParaRPr lang="es-ES" dirty="0" smtClean="0"/>
+          </a:p>
+          <a:p>
+            <a:r>
+              <a:rPr lang="es-ES" dirty="0" smtClean="0"/>
+              <a:t>(333 negativas +183 positivas)</a:t>
+            </a:r>
+          </a:p>
+          <a:p>
+            <a:endParaRPr lang="es-ES" dirty="0"/>
+          </a:p>
+          <a:p>
+            <a:r>
+              <a:rPr lang="es-ES" dirty="0" smtClean="0"/>
+              <a:t>ACC = 0.9888</a:t>
+            </a:r>
+          </a:p>
+          <a:p>
+            <a:r>
+              <a:rPr lang="es-ES" dirty="0" smtClean="0"/>
+              <a:t>F1 = 0.9914</a:t>
+            </a:r>
+          </a:p>
+          <a:p>
+            <a:endParaRPr lang="es-ES" dirty="0"/>
+          </a:p>
+          <a:p>
+            <a:r>
+              <a:rPr lang="es-ES" dirty="0" smtClean="0"/>
+              <a:t>6 Falsos positivos</a:t>
+            </a:r>
+            <a:endParaRPr lang="es-ES" dirty="0"/>
+          </a:p>
+          <a:p>
+            <a:endParaRPr lang="es-ES" dirty="0"/>
+          </a:p>
+        </p:txBody>
+      </p:sp>
+      <p:pic>
+        <p:nvPicPr>
+          <p:cNvPr id="4" name="Imagen 3"/>
+          <p:cNvPicPr>
+            <a:picLocks noChangeAspect="1"/>
+          </p:cNvPicPr>
+          <p:nvPr/>
+        </p:nvPicPr>
+        <p:blipFill>
+          <a:blip r:embed="rId2"/>
+          <a:stretch>
+            <a:fillRect/>
+          </a:stretch>
+        </p:blipFill>
+        <p:spPr>
+          <a:xfrm>
+            <a:off x="5964835" y="1930556"/>
+            <a:ext cx="5142876" cy="3657407"/>
+          </a:xfrm>
+          <a:prstGeom prst="rect">
+            <a:avLst/>
+          </a:prstGeom>
+        </p:spPr>
+      </p:pic>
+    </p:spTree>
+    <p:extLst>
+      <p:ext uri="{BB962C8B-B14F-4D97-AF65-F5344CB8AC3E}">
+        <p14:creationId xmlns:p14="http://schemas.microsoft.com/office/powerpoint/2010/main" val="3312838916"/>
+      </p:ext>
+    </p:extLst>
+  </p:cSld>
+  <p:clrMapOvr>
+    <a:masterClrMapping/>
+  </p:clrMapOvr>
+</p:sld>
+</file>
+
+<file path=ppt/slides/slide67.xml><?xml version="1.0" encoding="utf-8"?>
+<p:sld xmlns:a="http://schemas.openxmlformats.org/drawingml/2006/main" xmlns:r="http://schemas.openxmlformats.org/officeDocument/2006/relationships" xmlns:p="http://schemas.openxmlformats.org/presentationml/2006/main">
+  <p:cSld>
+    <p:spTree>
+      <p:nvGrpSpPr>
+        <p:cNvPr id="1" name=""/>
+        <p:cNvGrpSpPr/>
+        <p:nvPr/>
+      </p:nvGrpSpPr>
+      <p:grpSpPr>
+        <a:xfrm>
+          <a:off x="0" y="0"/>
+          <a:ext cx="0" cy="0"/>
+          <a:chOff x="0" y="0"/>
+          <a:chExt cx="0" cy="0"/>
+        </a:xfrm>
+      </p:grpSpPr>
+      <p:sp>
+        <p:nvSpPr>
+          <p:cNvPr id="2" name="Título 1"/>
+          <p:cNvSpPr>
+            <a:spLocks noGrp="1"/>
+          </p:cNvSpPr>
+          <p:nvPr>
+            <p:ph type="title"/>
+          </p:nvPr>
+        </p:nvSpPr>
+        <p:spPr/>
+        <p:txBody>
+          <a:bodyPr/>
+          <a:lstStyle/>
+          <a:p>
+            <a:r>
+              <a:rPr lang="es-ES" dirty="0" smtClean="0"/>
+              <a:t>Problema A: (</a:t>
+            </a:r>
+            <a:r>
+              <a:rPr lang="es-ES" dirty="0" err="1" smtClean="0"/>
+              <a:t>RNASeq</a:t>
+            </a:r>
+            <a:r>
+              <a:rPr lang="es-ES" dirty="0" smtClean="0"/>
+              <a:t>)</a:t>
+            </a:r>
+            <a:endParaRPr lang="es-ES" dirty="0"/>
+          </a:p>
+        </p:txBody>
+      </p:sp>
+      <p:sp>
+        <p:nvSpPr>
+          <p:cNvPr id="3" name="Marcador de contenido 2"/>
+          <p:cNvSpPr>
+            <a:spLocks noGrp="1"/>
+          </p:cNvSpPr>
+          <p:nvPr>
+            <p:ph idx="1"/>
+          </p:nvPr>
+        </p:nvSpPr>
+        <p:spPr/>
+        <p:txBody>
+          <a:bodyPr/>
+          <a:lstStyle/>
+          <a:p>
+            <a:r>
+              <a:rPr lang="es-ES" dirty="0" smtClean="0"/>
+              <a:t>Fusión de dos bases de datos con </a:t>
+            </a:r>
+            <a:r>
+              <a:rPr lang="es-ES" dirty="0" err="1" smtClean="0"/>
+              <a:t>preprocesamiento</a:t>
+            </a:r>
+            <a:r>
+              <a:rPr lang="es-ES" dirty="0" smtClean="0"/>
+              <a:t> distinto:</a:t>
+            </a:r>
+          </a:p>
+          <a:p>
+            <a:pPr marL="0" indent="0">
+              <a:buNone/>
+            </a:pPr>
+            <a:r>
+              <a:rPr lang="es-ES" b="1" dirty="0" err="1"/>
+              <a:t>Unifying</a:t>
+            </a:r>
+            <a:r>
+              <a:rPr lang="es-ES" b="1" dirty="0"/>
+              <a:t> </a:t>
+            </a:r>
+            <a:r>
+              <a:rPr lang="es-ES" b="1" dirty="0" smtClean="0"/>
+              <a:t>cáncer </a:t>
+            </a:r>
+            <a:r>
+              <a:rPr lang="en-US" b="1" dirty="0" smtClean="0"/>
+              <a:t>and </a:t>
+            </a:r>
+            <a:r>
+              <a:rPr lang="en-US" b="1" dirty="0"/>
+              <a:t>normal RNA sequencing </a:t>
+            </a:r>
+            <a:r>
+              <a:rPr lang="en-US" b="1" dirty="0" smtClean="0"/>
+              <a:t>data </a:t>
+            </a:r>
+            <a:r>
+              <a:rPr lang="es-ES" b="1" dirty="0" err="1" smtClean="0"/>
+              <a:t>from</a:t>
+            </a:r>
+            <a:r>
+              <a:rPr lang="es-ES" b="1" dirty="0" smtClean="0"/>
+              <a:t> </a:t>
+            </a:r>
+            <a:r>
+              <a:rPr lang="es-ES" b="1" dirty="0" err="1"/>
+              <a:t>different</a:t>
+            </a:r>
+            <a:r>
+              <a:rPr lang="es-ES" b="1" dirty="0"/>
+              <a:t> </a:t>
+            </a:r>
+            <a:r>
+              <a:rPr lang="es-ES" b="1" dirty="0" err="1" smtClean="0"/>
+              <a:t>sources</a:t>
+            </a:r>
+            <a:r>
+              <a:rPr lang="es-ES" b="1" dirty="0"/>
+              <a:t> </a:t>
+            </a:r>
+            <a:endParaRPr lang="es-ES" b="1" dirty="0" smtClean="0"/>
+          </a:p>
+          <a:p>
+            <a:pPr marL="0" indent="0">
+              <a:buNone/>
+            </a:pPr>
+            <a:r>
+              <a:rPr lang="es-ES" dirty="0" smtClean="0"/>
+              <a:t>DOI</a:t>
+            </a:r>
+            <a:r>
+              <a:rPr lang="es-ES" dirty="0"/>
+              <a:t>: </a:t>
+            </a:r>
+            <a:r>
+              <a:rPr lang="es-ES" dirty="0" smtClean="0"/>
+              <a:t>10.1038/sdata.2018.61 (2018)</a:t>
+            </a:r>
+          </a:p>
+          <a:p>
+            <a:pPr marL="0" indent="0">
+              <a:buNone/>
+            </a:pPr>
+            <a:endParaRPr lang="es-ES" dirty="0"/>
+          </a:p>
+          <a:p>
+            <a:pPr marL="0" indent="0">
+              <a:buNone/>
+            </a:pPr>
+            <a:r>
+              <a:rPr lang="es-ES" dirty="0" smtClean="0"/>
+              <a:t>Dos procesos para normalizar las bases de datos:</a:t>
+            </a:r>
+          </a:p>
+          <a:p>
+            <a:pPr marL="514350" indent="-514350">
+              <a:buAutoNum type="arabicPeriod"/>
+            </a:pPr>
+            <a:r>
+              <a:rPr lang="es-ES" dirty="0" err="1" smtClean="0"/>
+              <a:t>Preprocesamiento</a:t>
+            </a:r>
+            <a:r>
+              <a:rPr lang="es-ES" dirty="0" smtClean="0"/>
+              <a:t> uniforme.  STAR </a:t>
+            </a:r>
+            <a:r>
+              <a:rPr lang="es-ES" dirty="0" err="1" smtClean="0"/>
+              <a:t>Aligment</a:t>
+            </a:r>
+            <a:r>
+              <a:rPr lang="es-ES" dirty="0" smtClean="0"/>
+              <a:t> de los datos CRUDOS </a:t>
+            </a:r>
+          </a:p>
+          <a:p>
+            <a:pPr marL="514350" indent="-514350">
+              <a:buAutoNum type="arabicPeriod"/>
+            </a:pPr>
+            <a:r>
+              <a:rPr lang="es-ES" dirty="0" err="1" smtClean="0"/>
+              <a:t>Batch</a:t>
+            </a:r>
+            <a:r>
+              <a:rPr lang="es-ES" dirty="0" smtClean="0"/>
+              <a:t> </a:t>
+            </a:r>
+            <a:r>
+              <a:rPr lang="es-ES" dirty="0" err="1" smtClean="0"/>
+              <a:t>effect</a:t>
+            </a:r>
+            <a:r>
+              <a:rPr lang="es-ES" dirty="0" smtClean="0"/>
+              <a:t> </a:t>
+            </a:r>
+            <a:r>
+              <a:rPr lang="es-ES" dirty="0" err="1" smtClean="0"/>
+              <a:t>removal</a:t>
+            </a:r>
+            <a:r>
+              <a:rPr lang="es-ES" dirty="0" smtClean="0"/>
+              <a:t>.</a:t>
+            </a:r>
+          </a:p>
+          <a:p>
+            <a:pPr marL="0" indent="0">
+              <a:buNone/>
+            </a:pPr>
+            <a:endParaRPr lang="es-ES" dirty="0"/>
+          </a:p>
+        </p:txBody>
+      </p:sp>
+    </p:spTree>
+    <p:extLst>
+      <p:ext uri="{BB962C8B-B14F-4D97-AF65-F5344CB8AC3E}">
+        <p14:creationId xmlns:p14="http://schemas.microsoft.com/office/powerpoint/2010/main" val="3337403121"/>
+      </p:ext>
+    </p:extLst>
+  </p:cSld>
+  <p:clrMapOvr>
+    <a:masterClrMapping/>
+  </p:clrMapOvr>
+</p:sld>
+</file>
+
+<file path=ppt/slides/slide68.xml><?xml version="1.0" encoding="utf-8"?>
+<p:sld xmlns:a="http://schemas.openxmlformats.org/drawingml/2006/main" xmlns:r="http://schemas.openxmlformats.org/officeDocument/2006/relationships" xmlns:p="http://schemas.openxmlformats.org/presentationml/2006/main">
+  <p:cSld>
+    <p:spTree>
+      <p:nvGrpSpPr>
+        <p:cNvPr id="1" name=""/>
+        <p:cNvGrpSpPr/>
+        <p:nvPr/>
+      </p:nvGrpSpPr>
+      <p:grpSpPr>
+        <a:xfrm>
+          <a:off x="0" y="0"/>
+          <a:ext cx="0" cy="0"/>
+          <a:chOff x="0" y="0"/>
+          <a:chExt cx="0" cy="0"/>
+        </a:xfrm>
+      </p:grpSpPr>
+      <p:sp>
+        <p:nvSpPr>
+          <p:cNvPr id="2" name="Título 1"/>
+          <p:cNvSpPr>
+            <a:spLocks noGrp="1"/>
+          </p:cNvSpPr>
+          <p:nvPr>
+            <p:ph type="title"/>
+          </p:nvPr>
+        </p:nvSpPr>
+        <p:spPr/>
+        <p:txBody>
+          <a:bodyPr/>
+          <a:lstStyle/>
+          <a:p>
+            <a:r>
+              <a:rPr lang="es-ES" dirty="0" smtClean="0"/>
+              <a:t>Resultados en el </a:t>
+            </a:r>
+            <a:r>
+              <a:rPr lang="es-ES" dirty="0" err="1" smtClean="0"/>
+              <a:t>paper</a:t>
+            </a:r>
+            <a:r>
+              <a:rPr lang="es-ES" dirty="0" smtClean="0"/>
+              <a:t>:</a:t>
+            </a:r>
+            <a:endParaRPr lang="es-ES" dirty="0"/>
+          </a:p>
+        </p:txBody>
+      </p:sp>
+      <p:pic>
+        <p:nvPicPr>
+          <p:cNvPr id="4" name="Marcador de contenido 3"/>
+          <p:cNvPicPr>
+            <a:picLocks noGrp="1" noChangeAspect="1"/>
+          </p:cNvPicPr>
+          <p:nvPr>
+            <p:ph idx="1"/>
+          </p:nvPr>
+        </p:nvPicPr>
+        <p:blipFill>
+          <a:blip r:embed="rId2"/>
+          <a:stretch>
+            <a:fillRect/>
+          </a:stretch>
+        </p:blipFill>
+        <p:spPr>
+          <a:xfrm>
+            <a:off x="838200" y="1939611"/>
+            <a:ext cx="9670618" cy="3703641"/>
+          </a:xfrm>
+          <a:prstGeom prst="rect">
+            <a:avLst/>
+          </a:prstGeom>
+        </p:spPr>
+      </p:pic>
+    </p:spTree>
+    <p:extLst>
+      <p:ext uri="{BB962C8B-B14F-4D97-AF65-F5344CB8AC3E}">
+        <p14:creationId xmlns:p14="http://schemas.microsoft.com/office/powerpoint/2010/main" val="3960247585"/>
+      </p:ext>
+    </p:extLst>
+  </p:cSld>
+  <p:clrMapOvr>
+    <a:masterClrMapping/>
+  </p:clrMapOvr>
+</p:sld>
+</file>
+
+<file path=ppt/slides/slide69.xml><?xml version="1.0" encoding="utf-8"?>
+<p:sld xmlns:a="http://schemas.openxmlformats.org/drawingml/2006/main" xmlns:r="http://schemas.openxmlformats.org/officeDocument/2006/relationships" xmlns:p="http://schemas.openxmlformats.org/presentationml/2006/main">
+  <p:cSld>
+    <p:spTree>
+      <p:nvGrpSpPr>
+        <p:cNvPr id="1" name=""/>
+        <p:cNvGrpSpPr/>
+        <p:nvPr/>
+      </p:nvGrpSpPr>
+      <p:grpSpPr>
+        <a:xfrm>
+          <a:off x="0" y="0"/>
+          <a:ext cx="0" cy="0"/>
+          <a:chOff x="0" y="0"/>
+          <a:chExt cx="0" cy="0"/>
+        </a:xfrm>
+      </p:grpSpPr>
+      <p:sp>
+        <p:nvSpPr>
+          <p:cNvPr id="2" name="Título 1"/>
+          <p:cNvSpPr>
+            <a:spLocks noGrp="1"/>
+          </p:cNvSpPr>
+          <p:nvPr>
+            <p:ph type="title"/>
+          </p:nvPr>
+        </p:nvSpPr>
+        <p:spPr/>
+        <p:txBody>
+          <a:bodyPr/>
+          <a:lstStyle/>
+          <a:p>
+            <a:r>
+              <a:rPr lang="es-ES" dirty="0"/>
+              <a:t>Problema A: (</a:t>
+            </a:r>
+            <a:r>
+              <a:rPr lang="es-ES" dirty="0" err="1"/>
+              <a:t>RNASeq</a:t>
+            </a:r>
+            <a:r>
+              <a:rPr lang="es-ES" dirty="0"/>
+              <a:t>)</a:t>
+            </a:r>
+          </a:p>
+        </p:txBody>
+      </p:sp>
+      <p:sp>
+        <p:nvSpPr>
+          <p:cNvPr id="3" name="Marcador de contenido 2"/>
+          <p:cNvSpPr>
+            <a:spLocks noGrp="1"/>
+          </p:cNvSpPr>
+          <p:nvPr>
+            <p:ph idx="1"/>
+          </p:nvPr>
+        </p:nvSpPr>
+        <p:spPr/>
+        <p:txBody>
+          <a:bodyPr/>
+          <a:lstStyle/>
+          <a:p>
+            <a:r>
+              <a:rPr lang="es-ES" dirty="0" smtClean="0"/>
+              <a:t>Desafortunadamente no tengo acceso a los datos crudos (BAM) por lo que el </a:t>
+            </a:r>
+            <a:r>
+              <a:rPr lang="es-ES" dirty="0" err="1" smtClean="0"/>
+              <a:t>preprocesamiento</a:t>
+            </a:r>
+            <a:r>
+              <a:rPr lang="es-ES" dirty="0" smtClean="0"/>
+              <a:t> uniforme no es posible, y en el </a:t>
+            </a:r>
+            <a:r>
+              <a:rPr lang="es-ES" dirty="0" err="1" smtClean="0"/>
+              <a:t>paper</a:t>
+            </a:r>
+            <a:r>
+              <a:rPr lang="es-ES" dirty="0" smtClean="0"/>
+              <a:t> descubren que con corrección del efecto de lotes (</a:t>
+            </a:r>
+            <a:r>
+              <a:rPr lang="es-ES" dirty="0" err="1" smtClean="0"/>
+              <a:t>batch</a:t>
+            </a:r>
+            <a:r>
+              <a:rPr lang="es-ES" dirty="0" smtClean="0"/>
+              <a:t> </a:t>
+            </a:r>
+            <a:r>
+              <a:rPr lang="es-ES" dirty="0" err="1" smtClean="0"/>
+              <a:t>effect</a:t>
+            </a:r>
+            <a:r>
+              <a:rPr lang="es-ES" dirty="0" smtClean="0"/>
+              <a:t>) no es suficiente aun así decido comprobarlo.</a:t>
+            </a:r>
+            <a:endParaRPr lang="es-ES" dirty="0"/>
+          </a:p>
+        </p:txBody>
+      </p:sp>
+    </p:spTree>
+    <p:extLst>
+      <p:ext uri="{BB962C8B-B14F-4D97-AF65-F5344CB8AC3E}">
+        <p14:creationId xmlns:p14="http://schemas.microsoft.com/office/powerpoint/2010/main" val="1176268170"/>
       </p:ext>
     </p:extLst>
   </p:cSld>
@@ -11910,6 +13889,988 @@
     <p:extLst>
       <p:ext uri="{BB962C8B-B14F-4D97-AF65-F5344CB8AC3E}">
         <p14:creationId xmlns:p14="http://schemas.microsoft.com/office/powerpoint/2010/main" val="487349848"/>
+      </p:ext>
+    </p:extLst>
+  </p:cSld>
+  <p:clrMapOvr>
+    <a:masterClrMapping/>
+  </p:clrMapOvr>
+</p:sld>
+</file>
+
+<file path=ppt/slides/slide70.xml><?xml version="1.0" encoding="utf-8"?>
+<p:sld xmlns:a="http://schemas.openxmlformats.org/drawingml/2006/main" xmlns:r="http://schemas.openxmlformats.org/officeDocument/2006/relationships" xmlns:p="http://schemas.openxmlformats.org/presentationml/2006/main">
+  <p:cSld>
+    <p:spTree>
+      <p:nvGrpSpPr>
+        <p:cNvPr id="1" name=""/>
+        <p:cNvGrpSpPr/>
+        <p:nvPr/>
+      </p:nvGrpSpPr>
+      <p:grpSpPr>
+        <a:xfrm>
+          <a:off x="0" y="0"/>
+          <a:ext cx="0" cy="0"/>
+          <a:chOff x="0" y="0"/>
+          <a:chExt cx="0" cy="0"/>
+        </a:xfrm>
+      </p:grpSpPr>
+      <p:sp>
+        <p:nvSpPr>
+          <p:cNvPr id="2" name="Título 1"/>
+          <p:cNvSpPr>
+            <a:spLocks noGrp="1"/>
+          </p:cNvSpPr>
+          <p:nvPr>
+            <p:ph type="title"/>
+          </p:nvPr>
+        </p:nvSpPr>
+        <p:spPr/>
+        <p:txBody>
+          <a:bodyPr/>
+          <a:lstStyle/>
+          <a:p>
+            <a:r>
+              <a:rPr lang="es-ES" dirty="0" smtClean="0"/>
+              <a:t>PCA </a:t>
+            </a:r>
+            <a:r>
+              <a:rPr lang="es-ES" dirty="0" err="1" smtClean="0"/>
+              <a:t>RNASeq</a:t>
+            </a:r>
+            <a:endParaRPr lang="es-ES" dirty="0"/>
+          </a:p>
+        </p:txBody>
+      </p:sp>
+      <p:sp>
+        <p:nvSpPr>
+          <p:cNvPr id="3" name="Marcador de contenido 2"/>
+          <p:cNvSpPr>
+            <a:spLocks noGrp="1"/>
+          </p:cNvSpPr>
+          <p:nvPr>
+            <p:ph idx="1"/>
+          </p:nvPr>
+        </p:nvSpPr>
+        <p:spPr/>
+        <p:txBody>
+          <a:bodyPr/>
+          <a:lstStyle/>
+          <a:p>
+            <a:r>
+              <a:rPr lang="es-ES" dirty="0" smtClean="0"/>
+              <a:t>Se toma la expresión diferencial y se hace un análisis de componentes principales de dos componentes para los datos con y sin </a:t>
+            </a:r>
+            <a:r>
+              <a:rPr lang="es-ES" dirty="0" err="1" smtClean="0"/>
+              <a:t>batch</a:t>
+            </a:r>
+            <a:r>
+              <a:rPr lang="es-ES" dirty="0" smtClean="0"/>
+              <a:t> </a:t>
+            </a:r>
+            <a:r>
+              <a:rPr lang="es-ES" dirty="0" err="1" smtClean="0"/>
+              <a:t>effect</a:t>
+            </a:r>
+            <a:r>
+              <a:rPr lang="es-ES" dirty="0" smtClean="0"/>
+              <a:t> </a:t>
+            </a:r>
+            <a:r>
+              <a:rPr lang="es-ES" dirty="0" err="1" smtClean="0"/>
+              <a:t>removal</a:t>
+            </a:r>
+            <a:r>
+              <a:rPr lang="es-ES" dirty="0" smtClean="0"/>
+              <a:t>.</a:t>
+            </a:r>
+            <a:endParaRPr lang="es-ES" dirty="0"/>
+          </a:p>
+        </p:txBody>
+      </p:sp>
+      <p:pic>
+        <p:nvPicPr>
+          <p:cNvPr id="4" name="Imagen 3"/>
+          <p:cNvPicPr>
+            <a:picLocks noChangeAspect="1"/>
+          </p:cNvPicPr>
+          <p:nvPr/>
+        </p:nvPicPr>
+        <p:blipFill>
+          <a:blip r:embed="rId2">
+            <a:extLst>
+              <a:ext uri="{28A0092B-C50C-407E-A947-70E740481C1C}">
+                <a14:useLocalDpi xmlns:a14="http://schemas.microsoft.com/office/drawing/2010/main" val="0"/>
+              </a:ext>
+            </a:extLst>
+          </a:blip>
+          <a:stretch>
+            <a:fillRect/>
+          </a:stretch>
+        </p:blipFill>
+        <p:spPr>
+          <a:xfrm>
+            <a:off x="1072342" y="3681413"/>
+            <a:ext cx="3781425" cy="2495550"/>
+          </a:xfrm>
+          <a:prstGeom prst="rect">
+            <a:avLst/>
+          </a:prstGeom>
+        </p:spPr>
+      </p:pic>
+      <p:pic>
+        <p:nvPicPr>
+          <p:cNvPr id="5" name="Imagen 4"/>
+          <p:cNvPicPr>
+            <a:picLocks noChangeAspect="1"/>
+          </p:cNvPicPr>
+          <p:nvPr/>
+        </p:nvPicPr>
+        <p:blipFill>
+          <a:blip r:embed="rId3">
+            <a:extLst>
+              <a:ext uri="{28A0092B-C50C-407E-A947-70E740481C1C}">
+                <a14:useLocalDpi xmlns:a14="http://schemas.microsoft.com/office/drawing/2010/main" val="0"/>
+              </a:ext>
+            </a:extLst>
+          </a:blip>
+          <a:stretch>
+            <a:fillRect/>
+          </a:stretch>
+        </p:blipFill>
+        <p:spPr>
+          <a:xfrm>
+            <a:off x="6803778" y="3681413"/>
+            <a:ext cx="3724275" cy="2495550"/>
+          </a:xfrm>
+          <a:prstGeom prst="rect">
+            <a:avLst/>
+          </a:prstGeom>
+        </p:spPr>
+      </p:pic>
+    </p:spTree>
+    <p:extLst>
+      <p:ext uri="{BB962C8B-B14F-4D97-AF65-F5344CB8AC3E}">
+        <p14:creationId xmlns:p14="http://schemas.microsoft.com/office/powerpoint/2010/main" val="194853418"/>
+      </p:ext>
+    </p:extLst>
+  </p:cSld>
+  <p:clrMapOvr>
+    <a:masterClrMapping/>
+  </p:clrMapOvr>
+</p:sld>
+</file>
+
+<file path=ppt/slides/slide71.xml><?xml version="1.0" encoding="utf-8"?>
+<p:sld xmlns:a="http://schemas.openxmlformats.org/drawingml/2006/main" xmlns:r="http://schemas.openxmlformats.org/officeDocument/2006/relationships" xmlns:p="http://schemas.openxmlformats.org/presentationml/2006/main">
+  <p:cSld>
+    <p:spTree>
+      <p:nvGrpSpPr>
+        <p:cNvPr id="1" name=""/>
+        <p:cNvGrpSpPr/>
+        <p:nvPr/>
+      </p:nvGrpSpPr>
+      <p:grpSpPr>
+        <a:xfrm>
+          <a:off x="0" y="0"/>
+          <a:ext cx="0" cy="0"/>
+          <a:chOff x="0" y="0"/>
+          <a:chExt cx="0" cy="0"/>
+        </a:xfrm>
+      </p:grpSpPr>
+      <p:sp>
+        <p:nvSpPr>
+          <p:cNvPr id="2" name="Título 1"/>
+          <p:cNvSpPr>
+            <a:spLocks noGrp="1"/>
+          </p:cNvSpPr>
+          <p:nvPr>
+            <p:ph type="title"/>
+          </p:nvPr>
+        </p:nvSpPr>
+        <p:spPr/>
+        <p:txBody>
+          <a:bodyPr/>
+          <a:lstStyle/>
+          <a:p>
+            <a:r>
+              <a:rPr lang="es-ES" dirty="0"/>
+              <a:t>PCA </a:t>
+            </a:r>
+            <a:r>
+              <a:rPr lang="es-ES" dirty="0" err="1"/>
+              <a:t>RNASeq</a:t>
+            </a:r>
+            <a:endParaRPr lang="es-ES" dirty="0"/>
+          </a:p>
+        </p:txBody>
+      </p:sp>
+      <p:sp>
+        <p:nvSpPr>
+          <p:cNvPr id="3" name="Marcador de contenido 2"/>
+          <p:cNvSpPr>
+            <a:spLocks noGrp="1"/>
+          </p:cNvSpPr>
+          <p:nvPr>
+            <p:ph idx="1"/>
+          </p:nvPr>
+        </p:nvSpPr>
+        <p:spPr/>
+        <p:txBody>
+          <a:bodyPr/>
+          <a:lstStyle/>
+          <a:p>
+            <a:r>
+              <a:rPr lang="es-ES" dirty="0"/>
+              <a:t>D</a:t>
+            </a:r>
+            <a:r>
+              <a:rPr lang="es-ES" dirty="0" smtClean="0"/>
+              <a:t>e </a:t>
+            </a:r>
+            <a:r>
+              <a:rPr lang="es-ES" dirty="0"/>
+              <a:t>acuerdo con el artículo las bases de datos bien normalizadas deberían ser </a:t>
+            </a:r>
+            <a:r>
+              <a:rPr lang="es-ES" dirty="0" smtClean="0"/>
+              <a:t>similares</a:t>
+            </a:r>
+            <a:endParaRPr lang="es-ES" dirty="0"/>
+          </a:p>
+          <a:p>
+            <a:endParaRPr lang="es-ES" dirty="0" smtClean="0"/>
+          </a:p>
+          <a:p>
+            <a:r>
+              <a:rPr lang="es-ES" dirty="0" smtClean="0"/>
+              <a:t>Se confirma que el </a:t>
+            </a:r>
+            <a:r>
+              <a:rPr lang="es-ES" dirty="0" err="1" smtClean="0"/>
+              <a:t>preprocesamiento</a:t>
+            </a:r>
+            <a:r>
+              <a:rPr lang="es-ES" dirty="0" smtClean="0"/>
+              <a:t> uniforme es una parte vital de la normalización</a:t>
+            </a:r>
+            <a:endParaRPr lang="es-ES" dirty="0"/>
+          </a:p>
+          <a:p>
+            <a:endParaRPr lang="es-ES" dirty="0"/>
+          </a:p>
+        </p:txBody>
+      </p:sp>
+    </p:spTree>
+    <p:extLst>
+      <p:ext uri="{BB962C8B-B14F-4D97-AF65-F5344CB8AC3E}">
+        <p14:creationId xmlns:p14="http://schemas.microsoft.com/office/powerpoint/2010/main" val="2452856953"/>
+      </p:ext>
+    </p:extLst>
+  </p:cSld>
+  <p:clrMapOvr>
+    <a:masterClrMapping/>
+  </p:clrMapOvr>
+</p:sld>
+</file>
+
+<file path=ppt/slides/slide72.xml><?xml version="1.0" encoding="utf-8"?>
+<p:sld xmlns:a="http://schemas.openxmlformats.org/drawingml/2006/main" xmlns:r="http://schemas.openxmlformats.org/officeDocument/2006/relationships" xmlns:p="http://schemas.openxmlformats.org/presentationml/2006/main">
+  <p:cSld>
+    <p:spTree>
+      <p:nvGrpSpPr>
+        <p:cNvPr id="1" name=""/>
+        <p:cNvGrpSpPr/>
+        <p:nvPr/>
+      </p:nvGrpSpPr>
+      <p:grpSpPr>
+        <a:xfrm>
+          <a:off x="0" y="0"/>
+          <a:ext cx="0" cy="0"/>
+          <a:chOff x="0" y="0"/>
+          <a:chExt cx="0" cy="0"/>
+        </a:xfrm>
+      </p:grpSpPr>
+      <p:sp>
+        <p:nvSpPr>
+          <p:cNvPr id="2" name="Título 1"/>
+          <p:cNvSpPr>
+            <a:spLocks noGrp="1"/>
+          </p:cNvSpPr>
+          <p:nvPr>
+            <p:ph type="title"/>
+          </p:nvPr>
+        </p:nvSpPr>
+        <p:spPr/>
+        <p:txBody>
+          <a:bodyPr/>
+          <a:lstStyle/>
+          <a:p>
+            <a:r>
+              <a:rPr lang="es-ES" dirty="0" smtClean="0"/>
+              <a:t>Resumen problema A</a:t>
+            </a:r>
+            <a:endParaRPr lang="es-ES" dirty="0"/>
+          </a:p>
+        </p:txBody>
+      </p:sp>
+      <p:sp>
+        <p:nvSpPr>
+          <p:cNvPr id="3" name="Marcador de contenido 2"/>
+          <p:cNvSpPr>
+            <a:spLocks noGrp="1"/>
+          </p:cNvSpPr>
+          <p:nvPr>
+            <p:ph idx="1"/>
+          </p:nvPr>
+        </p:nvSpPr>
+        <p:spPr/>
+        <p:txBody>
+          <a:bodyPr/>
+          <a:lstStyle/>
+          <a:p>
+            <a:pPr marL="0" indent="0">
+              <a:buNone/>
+            </a:pPr>
+            <a:r>
+              <a:rPr lang="es-ES" dirty="0" smtClean="0"/>
+              <a:t>Se encuentran dos problema</a:t>
+            </a:r>
+          </a:p>
+          <a:p>
+            <a:pPr marL="0" indent="0">
+              <a:buNone/>
+            </a:pPr>
+            <a:endParaRPr lang="es-ES" dirty="0"/>
+          </a:p>
+          <a:p>
+            <a:pPr marL="514350" indent="-514350">
+              <a:buAutoNum type="arabicPeriod"/>
+            </a:pPr>
+            <a:r>
+              <a:rPr lang="es-ES" dirty="0" err="1" smtClean="0"/>
+              <a:t>Accuracy</a:t>
+            </a:r>
+            <a:r>
+              <a:rPr lang="es-ES" dirty="0" smtClean="0"/>
+              <a:t> del 98.9% para solo imágenes, es difícil observar una mejora usando fusión con la expresión de gen</a:t>
+            </a:r>
+          </a:p>
+          <a:p>
+            <a:pPr marL="514350" indent="-514350">
+              <a:buAutoNum type="arabicPeriod"/>
+            </a:pPr>
+            <a:r>
+              <a:rPr lang="es-ES" dirty="0" smtClean="0"/>
+              <a:t>Normalización de los datos no parece posible sin tener acceso a los ficheros BAM</a:t>
+            </a:r>
+          </a:p>
+          <a:p>
+            <a:pPr marL="514350" indent="-514350">
+              <a:buAutoNum type="arabicPeriod"/>
+            </a:pPr>
+            <a:endParaRPr lang="es-ES" dirty="0" smtClean="0"/>
+          </a:p>
+        </p:txBody>
+      </p:sp>
+    </p:spTree>
+    <p:extLst>
+      <p:ext uri="{BB962C8B-B14F-4D97-AF65-F5344CB8AC3E}">
+        <p14:creationId xmlns:p14="http://schemas.microsoft.com/office/powerpoint/2010/main" val="3418545432"/>
+      </p:ext>
+    </p:extLst>
+  </p:cSld>
+  <p:clrMapOvr>
+    <a:masterClrMapping/>
+  </p:clrMapOvr>
+</p:sld>
+</file>
+
+<file path=ppt/slides/slide73.xml><?xml version="1.0" encoding="utf-8"?>
+<p:sld xmlns:a="http://schemas.openxmlformats.org/drawingml/2006/main" xmlns:r="http://schemas.openxmlformats.org/officeDocument/2006/relationships" xmlns:p="http://schemas.openxmlformats.org/presentationml/2006/main">
+  <p:cSld>
+    <p:spTree>
+      <p:nvGrpSpPr>
+        <p:cNvPr id="1" name=""/>
+        <p:cNvGrpSpPr/>
+        <p:nvPr/>
+      </p:nvGrpSpPr>
+      <p:grpSpPr>
+        <a:xfrm>
+          <a:off x="0" y="0"/>
+          <a:ext cx="0" cy="0"/>
+          <a:chOff x="0" y="0"/>
+          <a:chExt cx="0" cy="0"/>
+        </a:xfrm>
+      </p:grpSpPr>
+      <p:sp>
+        <p:nvSpPr>
+          <p:cNvPr id="2" name="Título 1"/>
+          <p:cNvSpPr>
+            <a:spLocks noGrp="1"/>
+          </p:cNvSpPr>
+          <p:nvPr>
+            <p:ph type="title"/>
+          </p:nvPr>
+        </p:nvSpPr>
+        <p:spPr/>
+        <p:txBody>
+          <a:bodyPr/>
+          <a:lstStyle/>
+          <a:p>
+            <a:r>
+              <a:rPr lang="es-ES" dirty="0"/>
+              <a:t>Procesamiento de los datos </a:t>
+            </a:r>
+            <a:r>
+              <a:rPr lang="es-ES" dirty="0" smtClean="0"/>
+              <a:t>crudos GDC</a:t>
+            </a:r>
+            <a:endParaRPr lang="es-ES" dirty="0"/>
+          </a:p>
+        </p:txBody>
+      </p:sp>
+      <p:pic>
+        <p:nvPicPr>
+          <p:cNvPr id="4" name="Marcador de contenido 3"/>
+          <p:cNvPicPr>
+            <a:picLocks noGrp="1" noChangeAspect="1"/>
+          </p:cNvPicPr>
+          <p:nvPr>
+            <p:ph idx="1"/>
+          </p:nvPr>
+        </p:nvPicPr>
+        <p:blipFill>
+          <a:blip r:embed="rId2"/>
+          <a:stretch>
+            <a:fillRect/>
+          </a:stretch>
+        </p:blipFill>
+        <p:spPr>
+          <a:xfrm>
+            <a:off x="1763654" y="1882750"/>
+            <a:ext cx="8664691" cy="4237087"/>
+          </a:xfrm>
+          <a:prstGeom prst="rect">
+            <a:avLst/>
+          </a:prstGeom>
+        </p:spPr>
+      </p:pic>
+    </p:spTree>
+    <p:extLst>
+      <p:ext uri="{BB962C8B-B14F-4D97-AF65-F5344CB8AC3E}">
+        <p14:creationId xmlns:p14="http://schemas.microsoft.com/office/powerpoint/2010/main" val="2378024557"/>
+      </p:ext>
+    </p:extLst>
+  </p:cSld>
+  <p:clrMapOvr>
+    <a:masterClrMapping/>
+  </p:clrMapOvr>
+</p:sld>
+</file>
+
+<file path=ppt/slides/slide74.xml><?xml version="1.0" encoding="utf-8"?>
+<p:sld xmlns:a="http://schemas.openxmlformats.org/drawingml/2006/main" xmlns:r="http://schemas.openxmlformats.org/officeDocument/2006/relationships" xmlns:p="http://schemas.openxmlformats.org/presentationml/2006/main">
+  <p:cSld>
+    <p:spTree>
+      <p:nvGrpSpPr>
+        <p:cNvPr id="1" name=""/>
+        <p:cNvGrpSpPr/>
+        <p:nvPr/>
+      </p:nvGrpSpPr>
+      <p:grpSpPr>
+        <a:xfrm>
+          <a:off x="0" y="0"/>
+          <a:ext cx="0" cy="0"/>
+          <a:chOff x="0" y="0"/>
+          <a:chExt cx="0" cy="0"/>
+        </a:xfrm>
+      </p:grpSpPr>
+      <p:sp>
+        <p:nvSpPr>
+          <p:cNvPr id="2" name="Título 1"/>
+          <p:cNvSpPr>
+            <a:spLocks noGrp="1"/>
+          </p:cNvSpPr>
+          <p:nvPr>
+            <p:ph type="title"/>
+          </p:nvPr>
+        </p:nvSpPr>
+        <p:spPr/>
+        <p:txBody>
+          <a:bodyPr/>
+          <a:lstStyle/>
+          <a:p>
+            <a:r>
+              <a:rPr lang="es-ES" dirty="0" smtClean="0"/>
+              <a:t>Problema B:</a:t>
+            </a:r>
+            <a:endParaRPr lang="es-ES" dirty="0"/>
+          </a:p>
+        </p:txBody>
+      </p:sp>
+      <p:sp>
+        <p:nvSpPr>
+          <p:cNvPr id="3" name="Marcador de contenido 2"/>
+          <p:cNvSpPr>
+            <a:spLocks noGrp="1"/>
+          </p:cNvSpPr>
+          <p:nvPr>
+            <p:ph idx="1"/>
+          </p:nvPr>
+        </p:nvSpPr>
+        <p:spPr/>
+        <p:txBody>
+          <a:bodyPr/>
+          <a:lstStyle/>
+          <a:p>
+            <a:pPr marL="0" indent="0">
+              <a:buNone/>
+            </a:pPr>
+            <a:r>
+              <a:rPr lang="es-ES" dirty="0" smtClean="0"/>
+              <a:t>Interés de este problema</a:t>
+            </a:r>
+          </a:p>
+          <a:p>
+            <a:r>
+              <a:rPr lang="es-ES" dirty="0" smtClean="0"/>
+              <a:t>No existe nada en la bibliografía. </a:t>
+            </a:r>
+          </a:p>
+          <a:p>
+            <a:r>
+              <a:rPr lang="es-ES" dirty="0" smtClean="0"/>
+              <a:t>Posibles aplicaciones clínicas para ver si un tumor se puede operar (</a:t>
+            </a:r>
+            <a:r>
+              <a:rPr lang="es-ES" dirty="0" err="1" smtClean="0"/>
+              <a:t>resecable</a:t>
+            </a:r>
+            <a:r>
+              <a:rPr lang="es-ES" dirty="0" smtClean="0"/>
+              <a:t> o no </a:t>
+            </a:r>
+            <a:r>
+              <a:rPr lang="es-ES" dirty="0" err="1" smtClean="0"/>
+              <a:t>resecable</a:t>
+            </a:r>
+            <a:r>
+              <a:rPr lang="es-ES" dirty="0" smtClean="0"/>
+              <a:t>)</a:t>
+            </a:r>
+          </a:p>
+          <a:p>
+            <a:r>
+              <a:rPr lang="es-ES" dirty="0" smtClean="0"/>
+              <a:t>Descubrir si existe o no una expresión diferencial genética para el estadio de cáncer de páncreas</a:t>
+            </a:r>
+            <a:endParaRPr lang="es-ES" dirty="0"/>
+          </a:p>
+        </p:txBody>
+      </p:sp>
+    </p:spTree>
+    <p:extLst>
+      <p:ext uri="{BB962C8B-B14F-4D97-AF65-F5344CB8AC3E}">
+        <p14:creationId xmlns:p14="http://schemas.microsoft.com/office/powerpoint/2010/main" val="421892500"/>
+      </p:ext>
+    </p:extLst>
+  </p:cSld>
+  <p:clrMapOvr>
+    <a:masterClrMapping/>
+  </p:clrMapOvr>
+</p:sld>
+</file>
+
+<file path=ppt/slides/slide75.xml><?xml version="1.0" encoding="utf-8"?>
+<p:sld xmlns:a="http://schemas.openxmlformats.org/drawingml/2006/main" xmlns:r="http://schemas.openxmlformats.org/officeDocument/2006/relationships" xmlns:p="http://schemas.openxmlformats.org/presentationml/2006/main">
+  <p:cSld>
+    <p:spTree>
+      <p:nvGrpSpPr>
+        <p:cNvPr id="1" name=""/>
+        <p:cNvGrpSpPr/>
+        <p:nvPr/>
+      </p:nvGrpSpPr>
+      <p:grpSpPr>
+        <a:xfrm>
+          <a:off x="0" y="0"/>
+          <a:ext cx="0" cy="0"/>
+          <a:chOff x="0" y="0"/>
+          <a:chExt cx="0" cy="0"/>
+        </a:xfrm>
+      </p:grpSpPr>
+      <p:sp>
+        <p:nvSpPr>
+          <p:cNvPr id="2" name="Título 1"/>
+          <p:cNvSpPr>
+            <a:spLocks noGrp="1"/>
+          </p:cNvSpPr>
+          <p:nvPr>
+            <p:ph type="title"/>
+          </p:nvPr>
+        </p:nvSpPr>
+        <p:spPr/>
+        <p:txBody>
+          <a:bodyPr/>
+          <a:lstStyle/>
+          <a:p>
+            <a:r>
+              <a:rPr lang="es-ES" dirty="0"/>
+              <a:t>Problema B:</a:t>
+            </a:r>
+          </a:p>
+        </p:txBody>
+      </p:sp>
+      <p:sp>
+        <p:nvSpPr>
+          <p:cNvPr id="3" name="Marcador de contenido 2"/>
+          <p:cNvSpPr>
+            <a:spLocks noGrp="1"/>
+          </p:cNvSpPr>
+          <p:nvPr>
+            <p:ph idx="1"/>
+          </p:nvPr>
+        </p:nvSpPr>
+        <p:spPr/>
+        <p:txBody>
+          <a:bodyPr/>
+          <a:lstStyle/>
+          <a:p>
+            <a:r>
+              <a:rPr lang="es-ES" dirty="0"/>
+              <a:t>No se encuentran genes expresados diferencialmente, se prueba a variar LFC desde 0.5 a 2</a:t>
+            </a:r>
+          </a:p>
+          <a:p>
+            <a:endParaRPr lang="es-ES" dirty="0"/>
+          </a:p>
+        </p:txBody>
+      </p:sp>
+      <p:sp>
+        <p:nvSpPr>
+          <p:cNvPr id="4" name="Rectángulo 3"/>
+          <p:cNvSpPr/>
+          <p:nvPr/>
+        </p:nvSpPr>
+        <p:spPr>
+          <a:xfrm>
+            <a:off x="5432452" y="3244334"/>
+            <a:ext cx="184731" cy="369332"/>
+          </a:xfrm>
+          <a:prstGeom prst="rect">
+            <a:avLst/>
+          </a:prstGeom>
+        </p:spPr>
+        <p:txBody>
+          <a:bodyPr wrap="none">
+            <a:spAutoFit/>
+          </a:bodyPr>
+          <a:lstStyle/>
+          <a:p>
+            <a:endParaRPr lang="es-ES" dirty="0"/>
+          </a:p>
+        </p:txBody>
+      </p:sp>
+    </p:spTree>
+    <p:extLst>
+      <p:ext uri="{BB962C8B-B14F-4D97-AF65-F5344CB8AC3E}">
+        <p14:creationId xmlns:p14="http://schemas.microsoft.com/office/powerpoint/2010/main" val="1817178632"/>
+      </p:ext>
+    </p:extLst>
+  </p:cSld>
+  <p:clrMapOvr>
+    <a:masterClrMapping/>
+  </p:clrMapOvr>
+</p:sld>
+</file>
+
+<file path=ppt/slides/slide76.xml><?xml version="1.0" encoding="utf-8"?>
+<p:sld xmlns:a="http://schemas.openxmlformats.org/drawingml/2006/main" xmlns:r="http://schemas.openxmlformats.org/officeDocument/2006/relationships" xmlns:p="http://schemas.openxmlformats.org/presentationml/2006/main">
+  <p:cSld>
+    <p:spTree>
+      <p:nvGrpSpPr>
+        <p:cNvPr id="1" name=""/>
+        <p:cNvGrpSpPr/>
+        <p:nvPr/>
+      </p:nvGrpSpPr>
+      <p:grpSpPr>
+        <a:xfrm>
+          <a:off x="0" y="0"/>
+          <a:ext cx="0" cy="0"/>
+          <a:chOff x="0" y="0"/>
+          <a:chExt cx="0" cy="0"/>
+        </a:xfrm>
+      </p:grpSpPr>
+      <p:sp>
+        <p:nvSpPr>
+          <p:cNvPr id="2" name="Título 1"/>
+          <p:cNvSpPr>
+            <a:spLocks noGrp="1"/>
+          </p:cNvSpPr>
+          <p:nvPr>
+            <p:ph type="title"/>
+          </p:nvPr>
+        </p:nvSpPr>
+        <p:spPr/>
+        <p:txBody>
+          <a:bodyPr/>
+          <a:lstStyle/>
+          <a:p>
+            <a:r>
+              <a:rPr lang="es-ES" dirty="0" smtClean="0"/>
+              <a:t>Posibles soluciones</a:t>
+            </a:r>
+            <a:endParaRPr lang="es-ES" dirty="0"/>
+          </a:p>
+        </p:txBody>
+      </p:sp>
+      <p:sp>
+        <p:nvSpPr>
+          <p:cNvPr id="3" name="Marcador de contenido 2"/>
+          <p:cNvSpPr>
+            <a:spLocks noGrp="1"/>
+          </p:cNvSpPr>
+          <p:nvPr>
+            <p:ph idx="1"/>
+          </p:nvPr>
+        </p:nvSpPr>
+        <p:spPr/>
+        <p:txBody>
+          <a:bodyPr>
+            <a:normAutofit lnSpcReduction="10000"/>
+          </a:bodyPr>
+          <a:lstStyle/>
+          <a:p>
+            <a:r>
+              <a:rPr lang="es-ES" dirty="0"/>
+              <a:t>Intentar obtener acceso a los datos crudos de GDC y GTEX:</a:t>
+            </a:r>
+          </a:p>
+          <a:p>
+            <a:pPr lvl="1">
+              <a:buFontTx/>
+              <a:buChar char="-"/>
+            </a:pPr>
+            <a:r>
+              <a:rPr lang="es-ES" dirty="0"/>
+              <a:t>GDC puede tardar semanas en responder, </a:t>
+            </a:r>
+            <a:r>
+              <a:rPr lang="es-ES" dirty="0" err="1"/>
+              <a:t>GTEx</a:t>
+            </a:r>
+            <a:r>
+              <a:rPr lang="es-ES" dirty="0"/>
+              <a:t> parece responder pronto. </a:t>
+            </a:r>
+          </a:p>
+          <a:p>
+            <a:pPr lvl="1">
+              <a:buFontTx/>
+              <a:buChar char="-"/>
+            </a:pPr>
+            <a:r>
+              <a:rPr lang="es-ES" dirty="0" err="1"/>
+              <a:t>Accuracy</a:t>
+            </a:r>
+            <a:r>
+              <a:rPr lang="es-ES" dirty="0"/>
+              <a:t> cercano al 100%</a:t>
+            </a:r>
+          </a:p>
+          <a:p>
+            <a:pPr marL="0" indent="0">
+              <a:buNone/>
+            </a:pPr>
+            <a:endParaRPr lang="es-ES" dirty="0"/>
+          </a:p>
+          <a:p>
+            <a:r>
+              <a:rPr lang="es-ES" dirty="0"/>
+              <a:t>Continuar con cáncer </a:t>
+            </a:r>
+            <a:r>
+              <a:rPr lang="es-ES" dirty="0" err="1"/>
+              <a:t>colorectal</a:t>
+            </a:r>
+            <a:r>
+              <a:rPr lang="es-ES" dirty="0"/>
+              <a:t>:</a:t>
+            </a:r>
+          </a:p>
+          <a:p>
+            <a:pPr lvl="1">
+              <a:buFontTx/>
+              <a:buChar char="-"/>
+            </a:pPr>
+            <a:r>
+              <a:rPr lang="es-ES" dirty="0"/>
+              <a:t>No es un problema de 3 clases, no es posible distinguir COAD de READ Por lo que </a:t>
+            </a:r>
+            <a:r>
+              <a:rPr lang="es-ES" dirty="0" err="1"/>
+              <a:t>accuracy</a:t>
+            </a:r>
+            <a:r>
+              <a:rPr lang="es-ES" dirty="0"/>
+              <a:t> cercano al 100% sin </a:t>
+            </a:r>
+            <a:r>
+              <a:rPr lang="es-ES" dirty="0" err="1"/>
+              <a:t>multiómicas</a:t>
+            </a:r>
+            <a:r>
+              <a:rPr lang="es-ES" dirty="0" smtClean="0"/>
+              <a:t>.</a:t>
+            </a:r>
+          </a:p>
+          <a:p>
+            <a:endParaRPr lang="es-ES" dirty="0"/>
+          </a:p>
+          <a:p>
+            <a:r>
+              <a:rPr lang="es-ES" dirty="0" smtClean="0"/>
+              <a:t>Hacer problema de pronóstico(?)</a:t>
+            </a:r>
+            <a:endParaRPr lang="es-ES" sz="2400" dirty="0" smtClean="0"/>
+          </a:p>
+          <a:p>
+            <a:pPr marL="0" indent="0">
+              <a:buNone/>
+            </a:pPr>
+            <a:r>
+              <a:rPr lang="es-ES" sz="2400" dirty="0"/>
+              <a:t> </a:t>
+            </a:r>
+            <a:r>
+              <a:rPr lang="es-ES" sz="2400" dirty="0" smtClean="0"/>
+              <a:t>      -  Están balanceados </a:t>
+            </a:r>
+            <a:r>
+              <a:rPr lang="es-ES" sz="2400" smtClean="0"/>
+              <a:t>los datos?</a:t>
+            </a:r>
+            <a:endParaRPr lang="es-ES" sz="2400" dirty="0"/>
+          </a:p>
+          <a:p>
+            <a:pPr marL="0" indent="0">
+              <a:buNone/>
+            </a:pPr>
+            <a:endParaRPr lang="es-ES" sz="2400" dirty="0" smtClean="0"/>
+          </a:p>
+          <a:p>
+            <a:pPr marL="457200" lvl="1" indent="0">
+              <a:buNone/>
+            </a:pPr>
+            <a:endParaRPr lang="es-ES" dirty="0" smtClean="0"/>
+          </a:p>
+          <a:p>
+            <a:pPr marL="457200" lvl="1" indent="0">
+              <a:buNone/>
+            </a:pPr>
+            <a:endParaRPr lang="es-ES" dirty="0"/>
+          </a:p>
+        </p:txBody>
+      </p:sp>
+    </p:spTree>
+    <p:extLst>
+      <p:ext uri="{BB962C8B-B14F-4D97-AF65-F5344CB8AC3E}">
+        <p14:creationId xmlns:p14="http://schemas.microsoft.com/office/powerpoint/2010/main" val="1151012451"/>
+      </p:ext>
+    </p:extLst>
+  </p:cSld>
+  <p:clrMapOvr>
+    <a:masterClrMapping/>
+  </p:clrMapOvr>
+</p:sld>
+</file>
+
+<file path=ppt/slides/slide77.xml><?xml version="1.0" encoding="utf-8"?>
+<p:sld xmlns:a="http://schemas.openxmlformats.org/drawingml/2006/main" xmlns:r="http://schemas.openxmlformats.org/officeDocument/2006/relationships" xmlns:p="http://schemas.openxmlformats.org/presentationml/2006/main">
+  <p:cSld>
+    <p:spTree>
+      <p:nvGrpSpPr>
+        <p:cNvPr id="1" name=""/>
+        <p:cNvGrpSpPr/>
+        <p:nvPr/>
+      </p:nvGrpSpPr>
+      <p:grpSpPr>
+        <a:xfrm>
+          <a:off x="0" y="0"/>
+          <a:ext cx="0" cy="0"/>
+          <a:chOff x="0" y="0"/>
+          <a:chExt cx="0" cy="0"/>
+        </a:xfrm>
+      </p:grpSpPr>
+      <p:sp>
+        <p:nvSpPr>
+          <p:cNvPr id="2" name="Título 1"/>
+          <p:cNvSpPr>
+            <a:spLocks noGrp="1"/>
+          </p:cNvSpPr>
+          <p:nvPr>
+            <p:ph type="title"/>
+          </p:nvPr>
+        </p:nvSpPr>
+        <p:spPr/>
+        <p:txBody>
+          <a:bodyPr/>
+          <a:lstStyle/>
+          <a:p>
+            <a:r>
+              <a:rPr lang="es-ES" dirty="0" smtClean="0"/>
+              <a:t>Enlaces de interés</a:t>
+            </a:r>
+            <a:endParaRPr lang="es-ES" dirty="0"/>
+          </a:p>
+        </p:txBody>
+      </p:sp>
+      <p:sp>
+        <p:nvSpPr>
+          <p:cNvPr id="3" name="Marcador de contenido 2"/>
+          <p:cNvSpPr>
+            <a:spLocks noGrp="1"/>
+          </p:cNvSpPr>
+          <p:nvPr>
+            <p:ph idx="1"/>
+          </p:nvPr>
+        </p:nvSpPr>
+        <p:spPr/>
+        <p:txBody>
+          <a:bodyPr/>
+          <a:lstStyle/>
+          <a:p>
+            <a:pPr marL="0" indent="0">
+              <a:buNone/>
+            </a:pPr>
+            <a:endParaRPr lang="es-ES" dirty="0"/>
+          </a:p>
+          <a:p>
+            <a:r>
+              <a:rPr lang="es-ES" dirty="0" smtClean="0"/>
+              <a:t>Obtener acceso a datos controlados GDC:</a:t>
+            </a:r>
+          </a:p>
+          <a:p>
+            <a:pPr marL="0" indent="0">
+              <a:buNone/>
+            </a:pPr>
+            <a:r>
+              <a:rPr lang="es-ES" dirty="0" smtClean="0"/>
+              <a:t>https</a:t>
+            </a:r>
+            <a:r>
+              <a:rPr lang="es-ES" dirty="0"/>
+              <a:t>://gdc.cancer.gov/access-data/obtaining-access-controlled-data</a:t>
+            </a:r>
+          </a:p>
+        </p:txBody>
+      </p:sp>
+    </p:spTree>
+    <p:extLst>
+      <p:ext uri="{BB962C8B-B14F-4D97-AF65-F5344CB8AC3E}">
+        <p14:creationId xmlns:p14="http://schemas.microsoft.com/office/powerpoint/2010/main" val="1776649476"/>
       </p:ext>
     </p:extLst>
   </p:cSld>

</xml_diff>